<commit_message>
updated figure for catalog of medications
</commit_message>
<xml_diff>
--- a/input/images-source/MedicationCatalog.pptx
+++ b/input/images-source/MedicationCatalog.pptx
@@ -197,7 +197,7 @@
           <a:p>
             <a:fld id="{C0FC2EA5-DDD9-41B5-A743-573E81829967}" type="datetimeFigureOut">
               <a:rPr lang="fr-FR" smtClean="0"/>
-              <a:t>07/05/2021</a:t>
+              <a:t>17/06/2021</a:t>
             </a:fld>
             <a:endParaRPr lang="fr-FR"/>
           </a:p>
@@ -684,7 +684,7 @@
           <a:p>
             <a:fld id="{DEBA1CB3-45B4-4365-8A01-D60AF6EBF46C}" type="datetimeFigureOut">
               <a:rPr lang="fr-FR" smtClean="0"/>
-              <a:t>07/05/2021</a:t>
+              <a:t>17/06/2021</a:t>
             </a:fld>
             <a:endParaRPr lang="fr-FR"/>
           </a:p>
@@ -854,7 +854,7 @@
           <a:p>
             <a:fld id="{DEBA1CB3-45B4-4365-8A01-D60AF6EBF46C}" type="datetimeFigureOut">
               <a:rPr lang="fr-FR" smtClean="0"/>
-              <a:t>07/05/2021</a:t>
+              <a:t>17/06/2021</a:t>
             </a:fld>
             <a:endParaRPr lang="fr-FR"/>
           </a:p>
@@ -1034,7 +1034,7 @@
           <a:p>
             <a:fld id="{DEBA1CB3-45B4-4365-8A01-D60AF6EBF46C}" type="datetimeFigureOut">
               <a:rPr lang="fr-FR" smtClean="0"/>
-              <a:t>07/05/2021</a:t>
+              <a:t>17/06/2021</a:t>
             </a:fld>
             <a:endParaRPr lang="fr-FR"/>
           </a:p>
@@ -1204,7 +1204,7 @@
           <a:p>
             <a:fld id="{DEBA1CB3-45B4-4365-8A01-D60AF6EBF46C}" type="datetimeFigureOut">
               <a:rPr lang="fr-FR" smtClean="0"/>
-              <a:t>07/05/2021</a:t>
+              <a:t>17/06/2021</a:t>
             </a:fld>
             <a:endParaRPr lang="fr-FR"/>
           </a:p>
@@ -1448,7 +1448,7 @@
           <a:p>
             <a:fld id="{DEBA1CB3-45B4-4365-8A01-D60AF6EBF46C}" type="datetimeFigureOut">
               <a:rPr lang="fr-FR" smtClean="0"/>
-              <a:t>07/05/2021</a:t>
+              <a:t>17/06/2021</a:t>
             </a:fld>
             <a:endParaRPr lang="fr-FR"/>
           </a:p>
@@ -1680,7 +1680,7 @@
           <a:p>
             <a:fld id="{DEBA1CB3-45B4-4365-8A01-D60AF6EBF46C}" type="datetimeFigureOut">
               <a:rPr lang="fr-FR" smtClean="0"/>
-              <a:t>07/05/2021</a:t>
+              <a:t>17/06/2021</a:t>
             </a:fld>
             <a:endParaRPr lang="fr-FR"/>
           </a:p>
@@ -2047,7 +2047,7 @@
           <a:p>
             <a:fld id="{DEBA1CB3-45B4-4365-8A01-D60AF6EBF46C}" type="datetimeFigureOut">
               <a:rPr lang="fr-FR" smtClean="0"/>
-              <a:t>07/05/2021</a:t>
+              <a:t>17/06/2021</a:t>
             </a:fld>
             <a:endParaRPr lang="fr-FR"/>
           </a:p>
@@ -2165,7 +2165,7 @@
           <a:p>
             <a:fld id="{DEBA1CB3-45B4-4365-8A01-D60AF6EBF46C}" type="datetimeFigureOut">
               <a:rPr lang="fr-FR" smtClean="0"/>
-              <a:t>07/05/2021</a:t>
+              <a:t>17/06/2021</a:t>
             </a:fld>
             <a:endParaRPr lang="fr-FR"/>
           </a:p>
@@ -2260,7 +2260,7 @@
           <a:p>
             <a:fld id="{DEBA1CB3-45B4-4365-8A01-D60AF6EBF46C}" type="datetimeFigureOut">
               <a:rPr lang="fr-FR" smtClean="0"/>
-              <a:t>07/05/2021</a:t>
+              <a:t>17/06/2021</a:t>
             </a:fld>
             <a:endParaRPr lang="fr-FR"/>
           </a:p>
@@ -2537,7 +2537,7 @@
           <a:p>
             <a:fld id="{DEBA1CB3-45B4-4365-8A01-D60AF6EBF46C}" type="datetimeFigureOut">
               <a:rPr lang="fr-FR" smtClean="0"/>
-              <a:t>07/05/2021</a:t>
+              <a:t>17/06/2021</a:t>
             </a:fld>
             <a:endParaRPr lang="fr-FR"/>
           </a:p>
@@ -2794,7 +2794,7 @@
           <a:p>
             <a:fld id="{DEBA1CB3-45B4-4365-8A01-D60AF6EBF46C}" type="datetimeFigureOut">
               <a:rPr lang="fr-FR" smtClean="0"/>
-              <a:t>07/05/2021</a:t>
+              <a:t>17/06/2021</a:t>
             </a:fld>
             <a:endParaRPr lang="fr-FR"/>
           </a:p>
@@ -3007,7 +3007,7 @@
           <a:p>
             <a:fld id="{DEBA1CB3-45B4-4365-8A01-D60AF6EBF46C}" type="datetimeFigureOut">
               <a:rPr lang="fr-FR" smtClean="0"/>
-              <a:t>07/05/2021</a:t>
+              <a:t>17/06/2021</a:t>
             </a:fld>
             <a:endParaRPr lang="fr-FR"/>
           </a:p>
@@ -6342,7 +6342,18 @@
                   <a:srgbClr val="FFFF00"/>
                 </a:solidFill>
               </a:rPr>
-              <a:t>Precaution profile of ClinicalUseIssue</a:t>
+              <a:t>Warning </a:t>
+            </a:r>
+          </a:p>
+          <a:p>
+            <a:pPr algn="ctr"/>
+            <a:r>
+              <a:rPr lang="en-US" sz="1013" noProof="1">
+                <a:solidFill>
+                  <a:srgbClr val="FFFF00"/>
+                </a:solidFill>
+              </a:rPr>
+              <a:t>profile of ClinicalUseIssue</a:t>
             </a:r>
           </a:p>
         </p:txBody>
@@ -8757,6 +8768,46 @@
               <a:rPr lang="en-US" sz="900" noProof="1"/>
               <a:t>0..1</a:t>
             </a:r>
+          </a:p>
+        </p:txBody>
+      </p:sp>
+      <p:sp>
+        <p:nvSpPr>
+          <p:cNvPr id="115" name="ZoneTexte 114">
+            <a:extLst>
+              <a:ext uri="{FF2B5EF4-FFF2-40B4-BE49-F238E27FC236}">
+                <a16:creationId xmlns:a16="http://schemas.microsoft.com/office/drawing/2014/main" id="{B888A0A4-5DDD-4FB2-AE7E-157AC32F3568}"/>
+              </a:ext>
+            </a:extLst>
+          </p:cNvPr>
+          <p:cNvSpPr txBox="1"/>
+          <p:nvPr/>
+        </p:nvSpPr>
+        <p:spPr>
+          <a:xfrm>
+            <a:off x="3839844" y="4032675"/>
+            <a:ext cx="950237" cy="230832"/>
+          </a:xfrm>
+          <a:prstGeom prst="rect">
+            <a:avLst/>
+          </a:prstGeom>
+          <a:noFill/>
+        </p:spPr>
+        <p:txBody>
+          <a:bodyPr wrap="square" rtlCol="0">
+            <a:spAutoFit/>
+          </a:bodyPr>
+          <a:lstStyle/>
+          <a:p>
+            <a:r>
+              <a:rPr lang="en-US" sz="900" noProof="1">
+                <a:solidFill>
+                  <a:srgbClr val="0070C0"/>
+                </a:solidFill>
+              </a:rPr>
+              <a:t>ingredient.item</a:t>
+            </a:r>
+            <a:endParaRPr lang="en-US" sz="900" noProof="1"/>
           </a:p>
         </p:txBody>
       </p:sp>

</xml_diff>

<commit_message>
Updated drug catalog specification page
+ having updated the scripts
</commit_message>
<xml_diff>
--- a/input/images-source/MedicationCatalog.pptx
+++ b/input/images-source/MedicationCatalog.pptx
@@ -197,7 +197,7 @@
           <a:p>
             <a:fld id="{C0FC2EA5-DDD9-41B5-A743-573E81829967}" type="datetimeFigureOut">
               <a:rPr lang="fr-FR" smtClean="0"/>
-              <a:t>17/06/2021</a:t>
+              <a:t>13/08/2021</a:t>
             </a:fld>
             <a:endParaRPr lang="fr-FR"/>
           </a:p>
@@ -684,7 +684,7 @@
           <a:p>
             <a:fld id="{DEBA1CB3-45B4-4365-8A01-D60AF6EBF46C}" type="datetimeFigureOut">
               <a:rPr lang="fr-FR" smtClean="0"/>
-              <a:t>17/06/2021</a:t>
+              <a:t>13/08/2021</a:t>
             </a:fld>
             <a:endParaRPr lang="fr-FR"/>
           </a:p>
@@ -854,7 +854,7 @@
           <a:p>
             <a:fld id="{DEBA1CB3-45B4-4365-8A01-D60AF6EBF46C}" type="datetimeFigureOut">
               <a:rPr lang="fr-FR" smtClean="0"/>
-              <a:t>17/06/2021</a:t>
+              <a:t>13/08/2021</a:t>
             </a:fld>
             <a:endParaRPr lang="fr-FR"/>
           </a:p>
@@ -1034,7 +1034,7 @@
           <a:p>
             <a:fld id="{DEBA1CB3-45B4-4365-8A01-D60AF6EBF46C}" type="datetimeFigureOut">
               <a:rPr lang="fr-FR" smtClean="0"/>
-              <a:t>17/06/2021</a:t>
+              <a:t>13/08/2021</a:t>
             </a:fld>
             <a:endParaRPr lang="fr-FR"/>
           </a:p>
@@ -1204,7 +1204,7 @@
           <a:p>
             <a:fld id="{DEBA1CB3-45B4-4365-8A01-D60AF6EBF46C}" type="datetimeFigureOut">
               <a:rPr lang="fr-FR" smtClean="0"/>
-              <a:t>17/06/2021</a:t>
+              <a:t>13/08/2021</a:t>
             </a:fld>
             <a:endParaRPr lang="fr-FR"/>
           </a:p>
@@ -1448,7 +1448,7 @@
           <a:p>
             <a:fld id="{DEBA1CB3-45B4-4365-8A01-D60AF6EBF46C}" type="datetimeFigureOut">
               <a:rPr lang="fr-FR" smtClean="0"/>
-              <a:t>17/06/2021</a:t>
+              <a:t>13/08/2021</a:t>
             </a:fld>
             <a:endParaRPr lang="fr-FR"/>
           </a:p>
@@ -1680,7 +1680,7 @@
           <a:p>
             <a:fld id="{DEBA1CB3-45B4-4365-8A01-D60AF6EBF46C}" type="datetimeFigureOut">
               <a:rPr lang="fr-FR" smtClean="0"/>
-              <a:t>17/06/2021</a:t>
+              <a:t>13/08/2021</a:t>
             </a:fld>
             <a:endParaRPr lang="fr-FR"/>
           </a:p>
@@ -2047,7 +2047,7 @@
           <a:p>
             <a:fld id="{DEBA1CB3-45B4-4365-8A01-D60AF6EBF46C}" type="datetimeFigureOut">
               <a:rPr lang="fr-FR" smtClean="0"/>
-              <a:t>17/06/2021</a:t>
+              <a:t>13/08/2021</a:t>
             </a:fld>
             <a:endParaRPr lang="fr-FR"/>
           </a:p>
@@ -2165,7 +2165,7 @@
           <a:p>
             <a:fld id="{DEBA1CB3-45B4-4365-8A01-D60AF6EBF46C}" type="datetimeFigureOut">
               <a:rPr lang="fr-FR" smtClean="0"/>
-              <a:t>17/06/2021</a:t>
+              <a:t>13/08/2021</a:t>
             </a:fld>
             <a:endParaRPr lang="fr-FR"/>
           </a:p>
@@ -2260,7 +2260,7 @@
           <a:p>
             <a:fld id="{DEBA1CB3-45B4-4365-8A01-D60AF6EBF46C}" type="datetimeFigureOut">
               <a:rPr lang="fr-FR" smtClean="0"/>
-              <a:t>17/06/2021</a:t>
+              <a:t>13/08/2021</a:t>
             </a:fld>
             <a:endParaRPr lang="fr-FR"/>
           </a:p>
@@ -2537,7 +2537,7 @@
           <a:p>
             <a:fld id="{DEBA1CB3-45B4-4365-8A01-D60AF6EBF46C}" type="datetimeFigureOut">
               <a:rPr lang="fr-FR" smtClean="0"/>
-              <a:t>17/06/2021</a:t>
+              <a:t>13/08/2021</a:t>
             </a:fld>
             <a:endParaRPr lang="fr-FR"/>
           </a:p>
@@ -2794,7 +2794,7 @@
           <a:p>
             <a:fld id="{DEBA1CB3-45B4-4365-8A01-D60AF6EBF46C}" type="datetimeFigureOut">
               <a:rPr lang="fr-FR" smtClean="0"/>
-              <a:t>17/06/2021</a:t>
+              <a:t>13/08/2021</a:t>
             </a:fld>
             <a:endParaRPr lang="fr-FR"/>
           </a:p>
@@ -3007,7 +3007,7 @@
           <a:p>
             <a:fld id="{DEBA1CB3-45B4-4365-8A01-D60AF6EBF46C}" type="datetimeFigureOut">
               <a:rPr lang="fr-FR" smtClean="0"/>
-              <a:t>17/06/2021</a:t>
+              <a:t>13/08/2021</a:t>
             </a:fld>
             <a:endParaRPr lang="fr-FR"/>
           </a:p>
@@ -7522,7 +7522,7 @@
                   <a:srgbClr val="FFFF00"/>
                 </a:solidFill>
               </a:rPr>
-              <a:t>DrugIngredient profile of Ingredient</a:t>
+              <a:t>DrugSubstance profile of Substance</a:t>
             </a:r>
           </a:p>
         </p:txBody>

</xml_diff>

<commit_message>
ObservationDefinition profiles and examples updated for R5
</commit_message>
<xml_diff>
--- a/input/images-source/MedicationCatalog.pptx
+++ b/input/images-source/MedicationCatalog.pptx
@@ -3978,7 +3978,7 @@
         </p:nvSpPr>
         <p:spPr>
           <a:xfrm>
-            <a:off x="4722166" y="7188907"/>
+            <a:off x="4766616" y="7188907"/>
             <a:ext cx="96711" cy="132280"/>
           </a:xfrm>
           <a:prstGeom prst="rect">
@@ -4024,7 +4024,7 @@
         </p:nvSpPr>
         <p:spPr>
           <a:xfrm>
-            <a:off x="3864406" y="7188907"/>
+            <a:off x="3908856" y="7188907"/>
             <a:ext cx="96711" cy="132280"/>
           </a:xfrm>
           <a:prstGeom prst="rect">
@@ -4720,8 +4720,8 @@
         </p:nvSpPr>
         <p:spPr>
           <a:xfrm>
-            <a:off x="3771463" y="6729442"/>
-            <a:ext cx="1125471" cy="601464"/>
+            <a:off x="3722533" y="6729442"/>
+            <a:ext cx="1333937" cy="601464"/>
           </a:xfrm>
           <a:prstGeom prst="rect">
             <a:avLst/>
@@ -4800,7 +4800,7 @@
                   <a:srgbClr val="FFFF00"/>
                 </a:solidFill>
               </a:rPr>
-              <a:t>profile of ClinicalUseIssue</a:t>
+              <a:t>profile of ClinicalUseDefinition</a:t>
             </a:r>
           </a:p>
         </p:txBody>
@@ -6254,7 +6254,7 @@
                   <a:srgbClr val="FFFF00"/>
                 </a:solidFill>
               </a:rPr>
-              <a:t>Indication profile of ClinicalUseIssue</a:t>
+              <a:t>Indication profile of ClinicalUseDefinition</a:t>
             </a:r>
           </a:p>
         </p:txBody>
@@ -6273,8 +6273,8 @@
         </p:nvSpPr>
         <p:spPr>
           <a:xfrm>
-            <a:off x="3058755" y="5977612"/>
-            <a:ext cx="1034596" cy="601464"/>
+            <a:off x="2978150" y="5977612"/>
+            <a:ext cx="1176593" cy="601464"/>
           </a:xfrm>
           <a:prstGeom prst="rect">
             <a:avLst/>
@@ -6353,7 +6353,7 @@
                   <a:srgbClr val="FFFF00"/>
                 </a:solidFill>
               </a:rPr>
-              <a:t>profile of ClinicalUseIssue</a:t>
+              <a:t>profile of ClinicalDefinition</a:t>
             </a:r>
           </a:p>
         </p:txBody>
@@ -6421,9 +6421,9 @@
           <p:nvPr/>
         </p:nvCxnSpPr>
         <p:spPr>
-          <a:xfrm rot="16200000" flipH="1">
-            <a:off x="2784485" y="5186044"/>
-            <a:ext cx="1577748" cy="5388"/>
+          <a:xfrm rot="5400000">
+            <a:off x="2779682" y="5186629"/>
+            <a:ext cx="1577748" cy="4218"/>
           </a:xfrm>
           <a:prstGeom prst="bentConnector3">
             <a:avLst>
@@ -6593,7 +6593,7 @@
                   <a:srgbClr val="0070C0"/>
                 </a:solidFill>
               </a:rPr>
-              <a:t>ClinicalUseIssue </a:t>
+              <a:t>ClinicalUseDefinition </a:t>
             </a:r>
             <a:r>
               <a:rPr lang="en-US" sz="900" noProof="1"/>
@@ -6669,7 +6669,7 @@
         </p:nvSpPr>
         <p:spPr>
           <a:xfrm>
-            <a:off x="4327553" y="6245690"/>
+            <a:off x="4372003" y="6245690"/>
             <a:ext cx="751859" cy="404085"/>
           </a:xfrm>
           <a:prstGeom prst="rect">
@@ -6901,8 +6901,8 @@
         </p:nvCxnSpPr>
         <p:spPr>
           <a:xfrm rot="5400000">
-            <a:off x="3100803" y="6773104"/>
-            <a:ext cx="263876" cy="1360042"/>
+            <a:off x="3123028" y="6750879"/>
+            <a:ext cx="263876" cy="1404492"/>
           </a:xfrm>
           <a:prstGeom prst="bentConnector2">
             <a:avLst/>
@@ -6945,8 +6945,8 @@
         </p:nvCxnSpPr>
         <p:spPr>
           <a:xfrm rot="5400000">
-            <a:off x="3160667" y="6731448"/>
-            <a:ext cx="574075" cy="1772990"/>
+            <a:off x="3188319" y="6703797"/>
+            <a:ext cx="574075" cy="1828293"/>
           </a:xfrm>
           <a:prstGeom prst="bentConnector2">
             <a:avLst/>
@@ -6989,8 +6989,8 @@
         </p:nvCxnSpPr>
         <p:spPr>
           <a:xfrm rot="5400000">
-            <a:off x="3205155" y="6668752"/>
-            <a:ext cx="912932" cy="2217802"/>
+            <a:off x="3227380" y="6646527"/>
+            <a:ext cx="912932" cy="2262252"/>
           </a:xfrm>
           <a:prstGeom prst="bentConnector2">
             <a:avLst/>
@@ -7661,12 +7661,12 @@
         </p:nvCxnSpPr>
         <p:spPr>
           <a:xfrm rot="16200000" flipH="1">
-            <a:off x="2787643" y="5182886"/>
-            <a:ext cx="2329578" cy="763534"/>
+            <a:off x="2815294" y="5155234"/>
+            <a:ext cx="2329578" cy="818837"/>
           </a:xfrm>
           <a:prstGeom prst="bentConnector3">
             <a:avLst>
-              <a:gd name="adj1" fmla="val 34626"/>
+              <a:gd name="adj1" fmla="val 33373"/>
             </a:avLst>
           </a:prstGeom>
           <a:ln w="19050">
@@ -7855,7 +7855,7 @@
         <p:spPr>
           <a:xfrm>
             <a:off x="4568030" y="8663435"/>
-            <a:ext cx="1125471" cy="601464"/>
+            <a:ext cx="1295504" cy="601464"/>
           </a:xfrm>
           <a:prstGeom prst="rect">
             <a:avLst/>
@@ -7934,7 +7934,7 @@
                   <a:srgbClr val="FFFF00"/>
                 </a:solidFill>
               </a:rPr>
-              <a:t>profile of ClinicalUseIssue</a:t>
+              <a:t>profile of ClinicalUseDefinition</a:t>
             </a:r>
           </a:p>
         </p:txBody>
@@ -7957,12 +7957,12 @@
         </p:nvCxnSpPr>
         <p:spPr>
           <a:xfrm rot="16200000" flipH="1">
-            <a:off x="2218930" y="5751598"/>
-            <a:ext cx="4263571" cy="1560101"/>
+            <a:off x="2261438" y="5709090"/>
+            <a:ext cx="4263571" cy="1645117"/>
           </a:xfrm>
           <a:prstGeom prst="bentConnector3">
             <a:avLst>
-              <a:gd name="adj1" fmla="val 18902"/>
+              <a:gd name="adj1" fmla="val 18277"/>
             </a:avLst>
           </a:prstGeom>
           <a:ln w="19050">
@@ -7999,7 +7999,7 @@
         </p:nvSpPr>
         <p:spPr>
           <a:xfrm>
-            <a:off x="4055251" y="6472356"/>
+            <a:off x="4099701" y="6472356"/>
             <a:ext cx="356197" cy="230832"/>
           </a:xfrm>
           <a:prstGeom prst="rect">
@@ -8148,7 +8148,7 @@
         </p:nvSpPr>
         <p:spPr>
           <a:xfrm>
-            <a:off x="2379852" y="8941541"/>
+            <a:off x="1983473" y="8934554"/>
             <a:ext cx="2296150" cy="230832"/>
           </a:xfrm>
           <a:prstGeom prst="rect">
@@ -8187,8 +8187,8 @@
         </p:nvSpPr>
         <p:spPr>
           <a:xfrm>
-            <a:off x="5636068" y="9507496"/>
-            <a:ext cx="1029523" cy="601464"/>
+            <a:off x="5370088" y="9507496"/>
+            <a:ext cx="1295504" cy="601464"/>
           </a:xfrm>
           <a:prstGeom prst="rect">
             <a:avLst/>
@@ -8267,7 +8267,7 @@
                   <a:srgbClr val="FFFF00"/>
                 </a:solidFill>
               </a:rPr>
-              <a:t>profile of ClinicalUseIssue</a:t>
+              <a:t>profile of ClinicalUseDefinition</a:t>
             </a:r>
           </a:p>
         </p:txBody>
@@ -8290,12 +8290,12 @@
         </p:nvCxnSpPr>
         <p:spPr>
           <a:xfrm rot="16200000" flipH="1">
-            <a:off x="2306931" y="5663597"/>
-            <a:ext cx="5107632" cy="2580165"/>
+            <a:off x="2240436" y="5730092"/>
+            <a:ext cx="5107632" cy="2447175"/>
           </a:xfrm>
           <a:prstGeom prst="bentConnector3">
             <a:avLst>
-              <a:gd name="adj1" fmla="val 15836"/>
+              <a:gd name="adj1" fmla="val 15189"/>
             </a:avLst>
           </a:prstGeom>
           <a:ln w="19050">
@@ -8524,7 +8524,7 @@
         <p:spPr>
           <a:xfrm rot="10800000">
             <a:off x="1341944" y="8300258"/>
-            <a:ext cx="4294124" cy="1507970"/>
+            <a:ext cx="4028144" cy="1507970"/>
           </a:xfrm>
           <a:prstGeom prst="bentConnector2">
             <a:avLst/>

</xml_diff>

<commit_message>
More corrections on examples of ValueSet and ObservationDefinition for R5 conformity
</commit_message>
<xml_diff>
--- a/input/images-source/MedicationCatalog.pptx
+++ b/input/images-source/MedicationCatalog.pptx
@@ -4982,7 +4982,7 @@
         </p:nvSpPr>
         <p:spPr>
           <a:xfrm>
-            <a:off x="3529374" y="5242109"/>
+            <a:off x="3404343" y="5230189"/>
             <a:ext cx="872690" cy="715837"/>
           </a:xfrm>
           <a:prstGeom prst="rect">
@@ -6273,8 +6273,8 @@
         </p:nvSpPr>
         <p:spPr>
           <a:xfrm>
-            <a:off x="2978150" y="5977612"/>
-            <a:ext cx="1176593" cy="601464"/>
+            <a:off x="2775651" y="5977612"/>
+            <a:ext cx="1285574" cy="601464"/>
           </a:xfrm>
           <a:prstGeom prst="rect">
             <a:avLst/>
@@ -6353,7 +6353,7 @@
                   <a:srgbClr val="FFFF00"/>
                 </a:solidFill>
               </a:rPr>
-              <a:t>profile of ClinicalDefinition</a:t>
+              <a:t>profile of ClinicalUseDefinition</a:t>
             </a:r>
           </a:p>
         </p:txBody>
@@ -6422,8 +6422,8 @@
         </p:nvCxnSpPr>
         <p:spPr>
           <a:xfrm rot="5400000">
-            <a:off x="2779682" y="5186629"/>
-            <a:ext cx="1577748" cy="4218"/>
+            <a:off x="2788806" y="5029497"/>
+            <a:ext cx="1577748" cy="318483"/>
           </a:xfrm>
           <a:prstGeom prst="bentConnector3">
             <a:avLst>
@@ -6464,7 +6464,7 @@
         </p:nvSpPr>
         <p:spPr>
           <a:xfrm>
-            <a:off x="3274155" y="5687546"/>
+            <a:off x="3118290" y="5687546"/>
             <a:ext cx="356197" cy="230832"/>
           </a:xfrm>
           <a:prstGeom prst="rect">
@@ -6573,7 +6573,7 @@
         </p:nvSpPr>
         <p:spPr>
           <a:xfrm>
-            <a:off x="3550379" y="4979217"/>
+            <a:off x="3706244" y="4979217"/>
             <a:ext cx="1672069" cy="230832"/>
           </a:xfrm>
           <a:prstGeom prst="rect">
@@ -7661,12 +7661,12 @@
         </p:nvCxnSpPr>
         <p:spPr>
           <a:xfrm rot="16200000" flipH="1">
-            <a:off x="2815294" y="5155234"/>
-            <a:ext cx="2329578" cy="818837"/>
+            <a:off x="2898422" y="5238362"/>
+            <a:ext cx="2329578" cy="652581"/>
           </a:xfrm>
           <a:prstGeom prst="bentConnector3">
             <a:avLst>
-              <a:gd name="adj1" fmla="val 33373"/>
+              <a:gd name="adj1" fmla="val 33942"/>
             </a:avLst>
           </a:prstGeom>
           <a:ln w="19050">
@@ -7808,7 +7808,7 @@
         </p:nvSpPr>
         <p:spPr>
           <a:xfrm>
-            <a:off x="3522309" y="4267584"/>
+            <a:off x="3688565" y="4267584"/>
             <a:ext cx="96711" cy="132280"/>
           </a:xfrm>
           <a:prstGeom prst="rect">
@@ -7957,12 +7957,12 @@
         </p:nvCxnSpPr>
         <p:spPr>
           <a:xfrm rot="16200000" flipH="1">
-            <a:off x="2261438" y="5709090"/>
-            <a:ext cx="4263571" cy="1645117"/>
+            <a:off x="2344566" y="5792218"/>
+            <a:ext cx="4263571" cy="1478861"/>
           </a:xfrm>
           <a:prstGeom prst="bentConnector3">
             <a:avLst>
-              <a:gd name="adj1" fmla="val 18277"/>
+              <a:gd name="adj1" fmla="val 18561"/>
             </a:avLst>
           </a:prstGeom>
           <a:ln w="19050">
@@ -8290,12 +8290,12 @@
         </p:nvCxnSpPr>
         <p:spPr>
           <a:xfrm rot="16200000" flipH="1">
-            <a:off x="2240436" y="5730092"/>
-            <a:ext cx="5107632" cy="2447175"/>
+            <a:off x="2323564" y="5813220"/>
+            <a:ext cx="5107632" cy="2280919"/>
           </a:xfrm>
           <a:prstGeom prst="bentConnector3">
             <a:avLst>
-              <a:gd name="adj1" fmla="val 15189"/>
+              <a:gd name="adj1" fmla="val 15415"/>
             </a:avLst>
           </a:prstGeom>
           <a:ln w="19050">
@@ -8332,7 +8332,7 @@
         </p:nvSpPr>
         <p:spPr>
           <a:xfrm>
-            <a:off x="5830289" y="9265691"/>
+            <a:off x="5715988" y="9265691"/>
             <a:ext cx="356197" cy="230832"/>
           </a:xfrm>
           <a:prstGeom prst="rect">
@@ -8367,7 +8367,7 @@
         </p:nvSpPr>
         <p:spPr>
           <a:xfrm>
-            <a:off x="5115804" y="8025198"/>
+            <a:off x="5188541" y="8025198"/>
             <a:ext cx="834992" cy="559961"/>
           </a:xfrm>
           <a:prstGeom prst="rect">
@@ -8420,7 +8420,7 @@
         </p:nvSpPr>
         <p:spPr>
           <a:xfrm>
-            <a:off x="6150829" y="8977022"/>
+            <a:off x="6026137" y="8977022"/>
             <a:ext cx="803879" cy="404085"/>
           </a:xfrm>
           <a:prstGeom prst="rect">

</xml_diff>

<commit_message>
Naming profiles as decided in last catalog call
</commit_message>
<xml_diff>
--- a/input/images-source/MedicationCatalog.pptx
+++ b/input/images-source/MedicationCatalog.pptx
@@ -259,7 +259,7 @@
           <a:p>
             <a:fld id="{0A46A26B-42CF-4B68-AB09-D93023A697CD}" type="datetimeFigureOut">
               <a:rPr lang="fr-FR" smtClean="0"/>
-              <a:t>20/08/2021</a:t>
+              <a:t>23/08/2021</a:t>
             </a:fld>
             <a:endParaRPr lang="fr-FR"/>
           </a:p>
@@ -457,7 +457,7 @@
           <a:p>
             <a:fld id="{0A46A26B-42CF-4B68-AB09-D93023A697CD}" type="datetimeFigureOut">
               <a:rPr lang="fr-FR" smtClean="0"/>
-              <a:t>20/08/2021</a:t>
+              <a:t>23/08/2021</a:t>
             </a:fld>
             <a:endParaRPr lang="fr-FR"/>
           </a:p>
@@ -665,7 +665,7 @@
           <a:p>
             <a:fld id="{0A46A26B-42CF-4B68-AB09-D93023A697CD}" type="datetimeFigureOut">
               <a:rPr lang="fr-FR" smtClean="0"/>
-              <a:t>20/08/2021</a:t>
+              <a:t>23/08/2021</a:t>
             </a:fld>
             <a:endParaRPr lang="fr-FR"/>
           </a:p>
@@ -863,7 +863,7 @@
           <a:p>
             <a:fld id="{0A46A26B-42CF-4B68-AB09-D93023A697CD}" type="datetimeFigureOut">
               <a:rPr lang="fr-FR" smtClean="0"/>
-              <a:t>20/08/2021</a:t>
+              <a:t>23/08/2021</a:t>
             </a:fld>
             <a:endParaRPr lang="fr-FR"/>
           </a:p>
@@ -1138,7 +1138,7 @@
           <a:p>
             <a:fld id="{0A46A26B-42CF-4B68-AB09-D93023A697CD}" type="datetimeFigureOut">
               <a:rPr lang="fr-FR" smtClean="0"/>
-              <a:t>20/08/2021</a:t>
+              <a:t>23/08/2021</a:t>
             </a:fld>
             <a:endParaRPr lang="fr-FR"/>
           </a:p>
@@ -1403,7 +1403,7 @@
           <a:p>
             <a:fld id="{0A46A26B-42CF-4B68-AB09-D93023A697CD}" type="datetimeFigureOut">
               <a:rPr lang="fr-FR" smtClean="0"/>
-              <a:t>20/08/2021</a:t>
+              <a:t>23/08/2021</a:t>
             </a:fld>
             <a:endParaRPr lang="fr-FR"/>
           </a:p>
@@ -1815,7 +1815,7 @@
           <a:p>
             <a:fld id="{0A46A26B-42CF-4B68-AB09-D93023A697CD}" type="datetimeFigureOut">
               <a:rPr lang="fr-FR" smtClean="0"/>
-              <a:t>20/08/2021</a:t>
+              <a:t>23/08/2021</a:t>
             </a:fld>
             <a:endParaRPr lang="fr-FR"/>
           </a:p>
@@ -1956,7 +1956,7 @@
           <a:p>
             <a:fld id="{0A46A26B-42CF-4B68-AB09-D93023A697CD}" type="datetimeFigureOut">
               <a:rPr lang="fr-FR" smtClean="0"/>
-              <a:t>20/08/2021</a:t>
+              <a:t>23/08/2021</a:t>
             </a:fld>
             <a:endParaRPr lang="fr-FR"/>
           </a:p>
@@ -2069,7 +2069,7 @@
           <a:p>
             <a:fld id="{0A46A26B-42CF-4B68-AB09-D93023A697CD}" type="datetimeFigureOut">
               <a:rPr lang="fr-FR" smtClean="0"/>
-              <a:t>20/08/2021</a:t>
+              <a:t>23/08/2021</a:t>
             </a:fld>
             <a:endParaRPr lang="fr-FR"/>
           </a:p>
@@ -2380,7 +2380,7 @@
           <a:p>
             <a:fld id="{0A46A26B-42CF-4B68-AB09-D93023A697CD}" type="datetimeFigureOut">
               <a:rPr lang="fr-FR" smtClean="0"/>
-              <a:t>20/08/2021</a:t>
+              <a:t>23/08/2021</a:t>
             </a:fld>
             <a:endParaRPr lang="fr-FR"/>
           </a:p>
@@ -2668,7 +2668,7 @@
           <a:p>
             <a:fld id="{0A46A26B-42CF-4B68-AB09-D93023A697CD}" type="datetimeFigureOut">
               <a:rPr lang="fr-FR" smtClean="0"/>
-              <a:t>20/08/2021</a:t>
+              <a:t>23/08/2021</a:t>
             </a:fld>
             <a:endParaRPr lang="fr-FR"/>
           </a:p>
@@ -2909,7 +2909,7 @@
           <a:p>
             <a:fld id="{0A46A26B-42CF-4B68-AB09-D93023A697CD}" type="datetimeFigureOut">
               <a:rPr lang="fr-FR" smtClean="0"/>
-              <a:t>20/08/2021</a:t>
+              <a:t>23/08/2021</a:t>
             </a:fld>
             <a:endParaRPr lang="fr-FR"/>
           </a:p>
@@ -3340,7 +3340,7 @@
         </p:nvSpPr>
         <p:spPr>
           <a:xfrm>
-            <a:off x="7281812" y="2211275"/>
+            <a:off x="7097743" y="2211275"/>
             <a:ext cx="133875" cy="105443"/>
           </a:xfrm>
           <a:prstGeom prst="rect">
@@ -3386,7 +3386,7 @@
         </p:nvSpPr>
         <p:spPr>
           <a:xfrm>
-            <a:off x="3403581" y="4208862"/>
+            <a:off x="3219512" y="4208862"/>
             <a:ext cx="96711" cy="132280"/>
           </a:xfrm>
           <a:prstGeom prst="rect">
@@ -3432,7 +3432,7 @@
         </p:nvSpPr>
         <p:spPr>
           <a:xfrm>
-            <a:off x="2932058" y="4208862"/>
+            <a:off x="2747989" y="4208862"/>
             <a:ext cx="96711" cy="132280"/>
           </a:xfrm>
           <a:prstGeom prst="rect">
@@ -3478,7 +3478,7 @@
         </p:nvSpPr>
         <p:spPr>
           <a:xfrm>
-            <a:off x="4368628" y="4208862"/>
+            <a:off x="4184559" y="4208862"/>
             <a:ext cx="96711" cy="132280"/>
           </a:xfrm>
           <a:prstGeom prst="rect">
@@ -3524,7 +3524,7 @@
         </p:nvSpPr>
         <p:spPr>
           <a:xfrm>
-            <a:off x="3952529" y="4208862"/>
+            <a:off x="3768460" y="4208862"/>
             <a:ext cx="96711" cy="132280"/>
           </a:xfrm>
           <a:prstGeom prst="rect">
@@ -3570,7 +3570,7 @@
         </p:nvSpPr>
         <p:spPr>
           <a:xfrm>
-            <a:off x="2924884" y="5050332"/>
+            <a:off x="2740815" y="5050332"/>
             <a:ext cx="96711" cy="132280"/>
           </a:xfrm>
           <a:prstGeom prst="rect">
@@ -3616,7 +3616,7 @@
         </p:nvSpPr>
         <p:spPr>
           <a:xfrm>
-            <a:off x="4380504" y="5044393"/>
+            <a:off x="4196435" y="5044393"/>
             <a:ext cx="96673" cy="307751"/>
           </a:xfrm>
           <a:prstGeom prst="rect">
@@ -3662,7 +3662,7 @@
         </p:nvSpPr>
         <p:spPr>
           <a:xfrm>
-            <a:off x="3952529" y="5050332"/>
+            <a:off x="3768460" y="5050332"/>
             <a:ext cx="96711" cy="132280"/>
           </a:xfrm>
           <a:prstGeom prst="rect">
@@ -3708,7 +3708,7 @@
         </p:nvSpPr>
         <p:spPr>
           <a:xfrm>
-            <a:off x="4358154" y="5049859"/>
+            <a:off x="4174085" y="5049859"/>
             <a:ext cx="133849" cy="218136"/>
           </a:xfrm>
           <a:prstGeom prst="rect">
@@ -3754,7 +3754,7 @@
         </p:nvSpPr>
         <p:spPr>
           <a:xfrm>
-            <a:off x="4358155" y="5675163"/>
+            <a:off x="4174086" y="5675163"/>
             <a:ext cx="133902" cy="93761"/>
           </a:xfrm>
           <a:prstGeom prst="rect">
@@ -3800,7 +3800,7 @@
         </p:nvSpPr>
         <p:spPr>
           <a:xfrm>
-            <a:off x="8475384" y="4819341"/>
+            <a:off x="8291315" y="4819341"/>
             <a:ext cx="96711" cy="132280"/>
           </a:xfrm>
           <a:prstGeom prst="rect">
@@ -3846,7 +3846,7 @@
         </p:nvSpPr>
         <p:spPr>
           <a:xfrm>
-            <a:off x="7837317" y="4819341"/>
+            <a:off x="7653248" y="4819341"/>
             <a:ext cx="96711" cy="132280"/>
           </a:xfrm>
           <a:prstGeom prst="rect">
@@ -3892,7 +3892,7 @@
         </p:nvSpPr>
         <p:spPr>
           <a:xfrm>
-            <a:off x="5928299" y="2256213"/>
+            <a:off x="5744230" y="2256213"/>
             <a:ext cx="159533" cy="115896"/>
           </a:xfrm>
           <a:prstGeom prst="rect">
@@ -3938,7 +3938,7 @@
         </p:nvSpPr>
         <p:spPr>
           <a:xfrm>
-            <a:off x="6097097" y="1690463"/>
+            <a:off x="5913028" y="1690463"/>
             <a:ext cx="159533" cy="231629"/>
           </a:xfrm>
           <a:prstGeom prst="rect">
@@ -3984,7 +3984,7 @@
         </p:nvSpPr>
         <p:spPr>
           <a:xfrm>
-            <a:off x="3971654" y="3071225"/>
+            <a:off x="3787585" y="3071225"/>
             <a:ext cx="191812" cy="110015"/>
           </a:xfrm>
           <a:prstGeom prst="rect">
@@ -4030,7 +4030,7 @@
         </p:nvSpPr>
         <p:spPr>
           <a:xfrm>
-            <a:off x="3971314" y="2635897"/>
+            <a:off x="3787245" y="2635897"/>
             <a:ext cx="191812" cy="110015"/>
           </a:xfrm>
           <a:prstGeom prst="rect">
@@ -4076,7 +4076,7 @@
         </p:nvSpPr>
         <p:spPr>
           <a:xfrm>
-            <a:off x="6127590" y="2307794"/>
+            <a:off x="5943521" y="2307794"/>
             <a:ext cx="159533" cy="132280"/>
           </a:xfrm>
           <a:prstGeom prst="rect">
@@ -4122,7 +4122,7 @@
         </p:nvSpPr>
         <p:spPr>
           <a:xfrm>
-            <a:off x="6332330" y="2307794"/>
+            <a:off x="6148261" y="2307794"/>
             <a:ext cx="159533" cy="132280"/>
           </a:xfrm>
           <a:prstGeom prst="rect">
@@ -4168,7 +4168,7 @@
         </p:nvSpPr>
         <p:spPr>
           <a:xfrm>
-            <a:off x="6212447" y="2099538"/>
+            <a:off x="6028378" y="2099538"/>
             <a:ext cx="159533" cy="132280"/>
           </a:xfrm>
           <a:prstGeom prst="rect">
@@ -4214,7 +4214,7 @@
         </p:nvSpPr>
         <p:spPr>
           <a:xfrm>
-            <a:off x="5907646" y="2333043"/>
+            <a:off x="5723577" y="2333043"/>
             <a:ext cx="191812" cy="110015"/>
           </a:xfrm>
           <a:prstGeom prst="rect">
@@ -4260,7 +4260,7 @@
         </p:nvSpPr>
         <p:spPr>
           <a:xfrm>
-            <a:off x="6094742" y="2119087"/>
+            <a:off x="5910673" y="2119087"/>
             <a:ext cx="191812" cy="110015"/>
           </a:xfrm>
           <a:prstGeom prst="rect">
@@ -4306,7 +4306,7 @@
         </p:nvSpPr>
         <p:spPr>
           <a:xfrm>
-            <a:off x="7233720" y="1796074"/>
+            <a:off x="7049651" y="1796074"/>
             <a:ext cx="191812" cy="162421"/>
           </a:xfrm>
           <a:prstGeom prst="rect">
@@ -4352,7 +4352,7 @@
         </p:nvSpPr>
         <p:spPr>
           <a:xfrm>
-            <a:off x="3334768" y="1107938"/>
+            <a:off x="3150699" y="1107938"/>
             <a:ext cx="482541" cy="246221"/>
           </a:xfrm>
           <a:prstGeom prst="rect">
@@ -4391,7 +4391,7 @@
         </p:nvCxnSpPr>
         <p:spPr>
           <a:xfrm rot="16200000" flipV="1">
-            <a:off x="4522601" y="215575"/>
+            <a:off x="4338532" y="215575"/>
             <a:ext cx="586924" cy="2356653"/>
           </a:xfrm>
           <a:prstGeom prst="bentConnector3">
@@ -4433,7 +4433,7 @@
         </p:nvSpPr>
         <p:spPr>
           <a:xfrm>
-            <a:off x="2840492" y="487671"/>
+            <a:off x="2656423" y="487671"/>
             <a:ext cx="1594487" cy="612769"/>
           </a:xfrm>
           <a:prstGeom prst="rect">
@@ -4495,7 +4495,7 @@
         </p:nvSpPr>
         <p:spPr>
           <a:xfrm>
-            <a:off x="3745881" y="1185932"/>
+            <a:off x="3561812" y="1185932"/>
             <a:ext cx="1415542" cy="246221"/>
           </a:xfrm>
           <a:prstGeom prst="rect">
@@ -4534,7 +4534,7 @@
         </p:nvSpPr>
         <p:spPr>
           <a:xfrm>
-            <a:off x="4531522" y="4913143"/>
+            <a:off x="4347453" y="4913143"/>
             <a:ext cx="408760" cy="246221"/>
           </a:xfrm>
           <a:prstGeom prst="rect">
@@ -4569,7 +4569,7 @@
         </p:nvSpPr>
         <p:spPr>
           <a:xfrm>
-            <a:off x="4538596" y="1657254"/>
+            <a:off x="4354527" y="1657254"/>
             <a:ext cx="1192438" cy="246221"/>
           </a:xfrm>
           <a:prstGeom prst="rect">
@@ -4608,7 +4608,7 @@
         </p:nvSpPr>
         <p:spPr>
           <a:xfrm>
-            <a:off x="1562008" y="408930"/>
+            <a:off x="1377939" y="408930"/>
             <a:ext cx="1274931" cy="830997"/>
           </a:xfrm>
           <a:prstGeom prst="rect">
@@ -4644,7 +4644,7 @@
         </p:nvSpPr>
         <p:spPr>
           <a:xfrm>
-            <a:off x="6080923" y="1241095"/>
+            <a:off x="5896854" y="1241095"/>
             <a:ext cx="1028423" cy="461665"/>
           </a:xfrm>
           <a:prstGeom prst="rect">
@@ -4698,7 +4698,7 @@
         </p:nvSpPr>
         <p:spPr>
           <a:xfrm>
-            <a:off x="7309049" y="2807184"/>
+            <a:off x="7124980" y="2807184"/>
             <a:ext cx="997886" cy="830997"/>
           </a:xfrm>
           <a:prstGeom prst="rect">
@@ -4751,7 +4751,7 @@
         </p:nvSpPr>
         <p:spPr>
           <a:xfrm>
-            <a:off x="2840492" y="2583698"/>
+            <a:off x="2656423" y="2583698"/>
             <a:ext cx="1335702" cy="627951"/>
           </a:xfrm>
           <a:prstGeom prst="rect">
@@ -4832,7 +4832,7 @@
         </p:nvSpPr>
         <p:spPr>
           <a:xfrm>
-            <a:off x="4170934" y="2935396"/>
+            <a:off x="3986865" y="2935396"/>
             <a:ext cx="386253" cy="246221"/>
           </a:xfrm>
           <a:prstGeom prst="rect">
@@ -4867,7 +4867,7 @@
         </p:nvSpPr>
         <p:spPr>
           <a:xfrm>
-            <a:off x="1695878" y="1537433"/>
+            <a:off x="1511809" y="1537433"/>
             <a:ext cx="1180137" cy="646331"/>
           </a:xfrm>
           <a:prstGeom prst="rect">
@@ -4905,7 +4905,7 @@
         </p:nvCxnSpPr>
         <p:spPr>
           <a:xfrm flipH="1" flipV="1">
-            <a:off x="7410462" y="1731667"/>
+            <a:off x="7226393" y="1731667"/>
             <a:ext cx="11343" cy="132155"/>
           </a:xfrm>
           <a:prstGeom prst="bentConnector3">
@@ -4947,7 +4947,7 @@
         </p:nvSpPr>
         <p:spPr>
           <a:xfrm>
-            <a:off x="7381592" y="1856943"/>
+            <a:off x="7197523" y="1856943"/>
             <a:ext cx="417459" cy="246221"/>
           </a:xfrm>
           <a:prstGeom prst="rect">
@@ -4982,7 +4982,7 @@
         </p:nvSpPr>
         <p:spPr>
           <a:xfrm>
-            <a:off x="7590321" y="1679268"/>
+            <a:off x="7406252" y="1679268"/>
             <a:ext cx="3208932" cy="246221"/>
           </a:xfrm>
           <a:prstGeom prst="rect">
@@ -5044,7 +5044,7 @@
         </p:nvSpPr>
         <p:spPr>
           <a:xfrm>
-            <a:off x="9118972" y="487671"/>
+            <a:off x="8934903" y="487671"/>
             <a:ext cx="1433977" cy="612769"/>
           </a:xfrm>
           <a:prstGeom prst="rect">
@@ -5110,7 +5110,7 @@
         </p:nvCxnSpPr>
         <p:spPr>
           <a:xfrm rot="5400000" flipH="1" flipV="1">
-            <a:off x="8254372" y="110646"/>
+            <a:off x="8070303" y="110646"/>
             <a:ext cx="591794" cy="2571383"/>
           </a:xfrm>
           <a:prstGeom prst="bentConnector3">
@@ -5152,7 +5152,7 @@
         </p:nvSpPr>
         <p:spPr>
           <a:xfrm>
-            <a:off x="7233720" y="1399334"/>
+            <a:off x="7049651" y="1399334"/>
             <a:ext cx="444133" cy="246221"/>
           </a:xfrm>
           <a:prstGeom prst="rect">
@@ -5187,7 +5187,7 @@
         </p:nvSpPr>
         <p:spPr>
           <a:xfrm>
-            <a:off x="10562658" y="391870"/>
+            <a:off x="10378589" y="391870"/>
             <a:ext cx="1123905" cy="830997"/>
           </a:xfrm>
           <a:prstGeom prst="rect">
@@ -5222,7 +5222,7 @@
         </p:nvSpPr>
         <p:spPr>
           <a:xfrm>
-            <a:off x="8997283" y="1183958"/>
+            <a:off x="8813214" y="1183958"/>
             <a:ext cx="898203" cy="246221"/>
           </a:xfrm>
           <a:prstGeom prst="rect">
@@ -5265,7 +5265,7 @@
         </p:nvCxnSpPr>
         <p:spPr>
           <a:xfrm flipV="1">
-            <a:off x="4163126" y="2443058"/>
+            <a:off x="3979057" y="2443058"/>
             <a:ext cx="1840426" cy="247847"/>
           </a:xfrm>
           <a:prstGeom prst="bentConnector2">
@@ -5309,7 +5309,7 @@
         </p:nvCxnSpPr>
         <p:spPr>
           <a:xfrm flipV="1">
-            <a:off x="4176194" y="2440074"/>
+            <a:off x="3992125" y="2440074"/>
             <a:ext cx="2031163" cy="457600"/>
           </a:xfrm>
           <a:prstGeom prst="bentConnector2">
@@ -5353,7 +5353,7 @@
         </p:nvCxnSpPr>
         <p:spPr>
           <a:xfrm flipV="1">
-            <a:off x="4163466" y="2440074"/>
+            <a:off x="3979397" y="2440074"/>
             <a:ext cx="2248631" cy="686159"/>
           </a:xfrm>
           <a:prstGeom prst="bentConnector2">
@@ -5393,7 +5393,7 @@
         </p:nvSpPr>
         <p:spPr>
           <a:xfrm>
-            <a:off x="4538596" y="2499705"/>
+            <a:off x="4354527" y="2470015"/>
             <a:ext cx="1355834" cy="246221"/>
           </a:xfrm>
           <a:prstGeom prst="rect">
@@ -5431,7 +5431,7 @@
         </p:nvSpPr>
         <p:spPr>
           <a:xfrm>
-            <a:off x="4538596" y="2706281"/>
+            <a:off x="4354527" y="2706281"/>
             <a:ext cx="579044" cy="246221"/>
           </a:xfrm>
           <a:prstGeom prst="rect">
@@ -5469,7 +5469,7 @@
         </p:nvSpPr>
         <p:spPr>
           <a:xfrm>
-            <a:off x="4538596" y="2933905"/>
+            <a:off x="4354527" y="2933905"/>
             <a:ext cx="838698" cy="246221"/>
           </a:xfrm>
           <a:prstGeom prst="rect">
@@ -5507,7 +5507,7 @@
         </p:nvSpPr>
         <p:spPr>
           <a:xfrm>
-            <a:off x="4175179" y="2501002"/>
+            <a:off x="3991110" y="2501002"/>
             <a:ext cx="405123" cy="246221"/>
           </a:xfrm>
           <a:prstGeom prst="rect">
@@ -5542,7 +5542,7 @@
         </p:nvSpPr>
         <p:spPr>
           <a:xfrm>
-            <a:off x="4168794" y="2712588"/>
+            <a:off x="3984725" y="2712588"/>
             <a:ext cx="388393" cy="246221"/>
           </a:xfrm>
           <a:prstGeom prst="rect">
@@ -5581,7 +5581,7 @@
         </p:nvCxnSpPr>
         <p:spPr>
           <a:xfrm rot="10800000" flipV="1">
-            <a:off x="4458516" y="1879957"/>
+            <a:off x="4274447" y="1879957"/>
             <a:ext cx="1483311" cy="766"/>
           </a:xfrm>
           <a:prstGeom prst="bentConnector3">
@@ -5623,7 +5623,7 @@
         </p:nvSpPr>
         <p:spPr>
           <a:xfrm>
-            <a:off x="2840492" y="1593809"/>
+            <a:off x="2656423" y="1593809"/>
             <a:ext cx="1618023" cy="573827"/>
           </a:xfrm>
           <a:prstGeom prst="rect">
@@ -5704,7 +5704,7 @@
         </p:nvSpPr>
         <p:spPr>
           <a:xfrm>
-            <a:off x="4462392" y="1886710"/>
+            <a:off x="4278323" y="1886710"/>
             <a:ext cx="405123" cy="246221"/>
           </a:xfrm>
           <a:prstGeom prst="rect">
@@ -5739,8 +5739,8 @@
         </p:nvSpPr>
         <p:spPr>
           <a:xfrm>
-            <a:off x="2840492" y="3750965"/>
-            <a:ext cx="1666397" cy="601464"/>
+            <a:off x="2656423" y="3713357"/>
+            <a:ext cx="1666397" cy="639072"/>
           </a:xfrm>
           <a:prstGeom prst="rect">
             <a:avLst/>
@@ -5801,7 +5801,7 @@
                   <a:srgbClr val="FFFF00"/>
                 </a:solidFill>
               </a:rPr>
-              <a:t>Indication profile of ClinicalUseDefinition</a:t>
+              <a:t>IndicationDefinition profile of ClinicalUseDefinition</a:t>
             </a:r>
           </a:p>
         </p:txBody>
@@ -5820,7 +5820,7 @@
         </p:nvSpPr>
         <p:spPr>
           <a:xfrm>
-            <a:off x="6483715" y="3554607"/>
+            <a:off x="6299646" y="3554607"/>
             <a:ext cx="1666398" cy="601464"/>
           </a:xfrm>
           <a:prstGeom prst="rect">
@@ -5882,7 +5882,7 @@
                   <a:srgbClr val="FFFF00"/>
                 </a:solidFill>
               </a:rPr>
-              <a:t>Warning </a:t>
+              <a:t>WarningDefinition </a:t>
             </a:r>
           </a:p>
           <a:p>
@@ -5916,12 +5916,12 @@
         </p:nvCxnSpPr>
         <p:spPr>
           <a:xfrm rot="5400000">
-            <a:off x="4495477" y="1626521"/>
-            <a:ext cx="1302659" cy="2946229"/>
+            <a:off x="4330212" y="1607717"/>
+            <a:ext cx="1265051" cy="2946229"/>
           </a:xfrm>
           <a:prstGeom prst="bentConnector3">
             <a:avLst>
-              <a:gd name="adj1" fmla="val 73702"/>
+              <a:gd name="adj1" fmla="val 76284"/>
             </a:avLst>
           </a:prstGeom>
           <a:ln w="19050">
@@ -5962,7 +5962,7 @@
         </p:nvCxnSpPr>
         <p:spPr>
           <a:xfrm rot="16200000" flipH="1">
-            <a:off x="6758683" y="2996375"/>
+            <a:off x="6574614" y="2996375"/>
             <a:ext cx="1114607" cy="1856"/>
           </a:xfrm>
           <a:prstGeom prst="bentConnector3">
@@ -6004,7 +6004,7 @@
         </p:nvSpPr>
         <p:spPr>
           <a:xfrm>
-            <a:off x="6974054" y="3264541"/>
+            <a:off x="6789985" y="3264541"/>
             <a:ext cx="405140" cy="246221"/>
           </a:xfrm>
           <a:prstGeom prst="rect">
@@ -6039,7 +6039,7 @@
         </p:nvSpPr>
         <p:spPr>
           <a:xfrm>
-            <a:off x="3346867" y="3510387"/>
+            <a:off x="3134183" y="3504600"/>
             <a:ext cx="423703" cy="246221"/>
           </a:xfrm>
           <a:prstGeom prst="rect">
@@ -6074,7 +6074,7 @@
         </p:nvSpPr>
         <p:spPr>
           <a:xfrm>
-            <a:off x="4538596" y="3201017"/>
+            <a:off x="4354527" y="3201017"/>
             <a:ext cx="2005686" cy="246221"/>
           </a:xfrm>
           <a:prstGeom prst="rect">
@@ -6113,7 +6113,7 @@
         </p:nvSpPr>
         <p:spPr>
           <a:xfrm>
-            <a:off x="7260713" y="2626873"/>
+            <a:off x="7076644" y="2626873"/>
             <a:ext cx="1877884" cy="246221"/>
           </a:xfrm>
           <a:prstGeom prst="rect">
@@ -6156,7 +6156,7 @@
         </p:nvSpPr>
         <p:spPr>
           <a:xfrm>
-            <a:off x="1890897" y="3705685"/>
+            <a:off x="1706828" y="3705685"/>
             <a:ext cx="924161" cy="646331"/>
           </a:xfrm>
           <a:prstGeom prst="rect">
@@ -6210,7 +6210,7 @@
         </p:nvSpPr>
         <p:spPr>
           <a:xfrm>
-            <a:off x="8474601" y="3850172"/>
+            <a:off x="8290532" y="3850172"/>
             <a:ext cx="1207403" cy="461665"/>
           </a:xfrm>
           <a:prstGeom prst="rect">
@@ -6276,7 +6276,7 @@
         </p:nvCxnSpPr>
         <p:spPr>
           <a:xfrm flipH="1">
-            <a:off x="2973240" y="4341142"/>
+            <a:off x="2789171" y="4341142"/>
             <a:ext cx="7174" cy="709190"/>
           </a:xfrm>
           <a:prstGeom prst="straightConnector1">
@@ -6320,7 +6320,7 @@
         </p:nvCxnSpPr>
         <p:spPr>
           <a:xfrm flipH="1">
-            <a:off x="3451934" y="4341142"/>
+            <a:off x="3267865" y="4341142"/>
             <a:ext cx="3" cy="715128"/>
           </a:xfrm>
           <a:prstGeom prst="straightConnector1">
@@ -6364,7 +6364,7 @@
         </p:nvCxnSpPr>
         <p:spPr>
           <a:xfrm>
-            <a:off x="4000885" y="4341142"/>
+            <a:off x="3816816" y="4341142"/>
             <a:ext cx="0" cy="709190"/>
           </a:xfrm>
           <a:prstGeom prst="straightConnector1">
@@ -6408,7 +6408,7 @@
         </p:nvCxnSpPr>
         <p:spPr>
           <a:xfrm>
-            <a:off x="4416984" y="4341142"/>
+            <a:off x="4232915" y="4341142"/>
             <a:ext cx="11857" cy="703251"/>
           </a:xfrm>
           <a:prstGeom prst="straightConnector1">
@@ -6452,7 +6452,7 @@
         </p:nvCxnSpPr>
         <p:spPr>
           <a:xfrm rot="5400000">
-            <a:off x="6085185" y="3358439"/>
+            <a:off x="5901116" y="3358439"/>
             <a:ext cx="207306" cy="3393670"/>
           </a:xfrm>
           <a:prstGeom prst="bentConnector2">
@@ -6496,7 +6496,7 @@
         </p:nvCxnSpPr>
         <p:spPr>
           <a:xfrm rot="5400000">
-            <a:off x="6104635" y="3352490"/>
+            <a:off x="5920566" y="3352490"/>
             <a:ext cx="483831" cy="3692009"/>
           </a:xfrm>
           <a:prstGeom prst="bentConnector2">
@@ -6540,7 +6540,7 @@
         </p:nvCxnSpPr>
         <p:spPr>
           <a:xfrm rot="5400000">
-            <a:off x="6122688" y="3320991"/>
+            <a:off x="5938619" y="3320991"/>
             <a:ext cx="770423" cy="4031683"/>
           </a:xfrm>
           <a:prstGeom prst="bentConnector2">
@@ -6580,7 +6580,7 @@
         </p:nvSpPr>
         <p:spPr>
           <a:xfrm>
-            <a:off x="5359915" y="5519823"/>
+            <a:off x="5175846" y="5519823"/>
             <a:ext cx="2743409" cy="246221"/>
           </a:xfrm>
           <a:prstGeom prst="rect">
@@ -6619,7 +6619,7 @@
         </p:nvSpPr>
         <p:spPr>
           <a:xfrm>
-            <a:off x="4531440" y="5543820"/>
+            <a:off x="4347371" y="5543820"/>
             <a:ext cx="405123" cy="246221"/>
           </a:xfrm>
           <a:prstGeom prst="rect">
@@ -6654,7 +6654,7 @@
         </p:nvSpPr>
         <p:spPr>
           <a:xfrm>
-            <a:off x="5359915" y="5228203"/>
+            <a:off x="5175846" y="5228203"/>
             <a:ext cx="1956680" cy="246221"/>
           </a:xfrm>
           <a:prstGeom prst="rect">
@@ -6693,7 +6693,7 @@
         </p:nvSpPr>
         <p:spPr>
           <a:xfrm>
-            <a:off x="4529911" y="5248301"/>
+            <a:off x="4345842" y="5248301"/>
             <a:ext cx="405123" cy="246221"/>
           </a:xfrm>
           <a:prstGeom prst="rect">
@@ -6728,7 +6728,7 @@
         </p:nvSpPr>
         <p:spPr>
           <a:xfrm>
-            <a:off x="5359915" y="4951586"/>
+            <a:off x="5175846" y="4951586"/>
             <a:ext cx="1942201" cy="246221"/>
           </a:xfrm>
           <a:prstGeom prst="rect">
@@ -6767,7 +6767,7 @@
         </p:nvSpPr>
         <p:spPr>
           <a:xfrm>
-            <a:off x="2615745" y="4789804"/>
+            <a:off x="2431676" y="4789804"/>
             <a:ext cx="386253" cy="246221"/>
           </a:xfrm>
           <a:prstGeom prst="rect">
@@ -6802,7 +6802,7 @@
         </p:nvSpPr>
         <p:spPr>
           <a:xfrm>
-            <a:off x="3606245" y="4345976"/>
+            <a:off x="3422176" y="4345976"/>
             <a:ext cx="876617" cy="400110"/>
           </a:xfrm>
           <a:prstGeom prst="rect">
@@ -6853,7 +6853,7 @@
         </p:nvSpPr>
         <p:spPr>
           <a:xfrm>
-            <a:off x="882457" y="4345976"/>
+            <a:off x="698388" y="4345976"/>
             <a:ext cx="2148521" cy="246221"/>
           </a:xfrm>
           <a:prstGeom prst="rect">
@@ -6893,7 +6893,7 @@
         </p:nvSpPr>
         <p:spPr>
           <a:xfrm>
-            <a:off x="2890337" y="4475614"/>
+            <a:off x="2706268" y="4475614"/>
             <a:ext cx="945279" cy="400110"/>
           </a:xfrm>
           <a:prstGeom prst="rect">
@@ -6944,7 +6944,7 @@
         </p:nvSpPr>
         <p:spPr>
           <a:xfrm>
-            <a:off x="4411815" y="4345976"/>
+            <a:off x="4227746" y="4345976"/>
             <a:ext cx="1819711" cy="246221"/>
           </a:xfrm>
           <a:prstGeom prst="rect">
@@ -6983,7 +6983,7 @@
         </p:nvSpPr>
         <p:spPr>
           <a:xfrm>
-            <a:off x="10575450" y="2053746"/>
+            <a:off x="10391381" y="2053746"/>
             <a:ext cx="1123904" cy="461665"/>
           </a:xfrm>
           <a:prstGeom prst="rect">
@@ -7022,7 +7022,7 @@
         </p:nvCxnSpPr>
         <p:spPr>
           <a:xfrm>
-            <a:off x="7415687" y="2263997"/>
+            <a:off x="7231618" y="2263997"/>
             <a:ext cx="1723575" cy="893"/>
           </a:xfrm>
           <a:prstGeom prst="bentConnector3">
@@ -7064,7 +7064,7 @@
         </p:nvSpPr>
         <p:spPr>
           <a:xfrm>
-            <a:off x="8800633" y="2279905"/>
+            <a:off x="8616564" y="2279905"/>
             <a:ext cx="417459" cy="246221"/>
           </a:xfrm>
           <a:prstGeom prst="rect">
@@ -7103,12 +7103,12 @@
         </p:nvCxnSpPr>
         <p:spPr>
           <a:xfrm rot="16200000" flipH="1">
-            <a:off x="6948961" y="2806097"/>
+            <a:off x="6764892" y="2806097"/>
             <a:ext cx="1919876" cy="1187682"/>
           </a:xfrm>
           <a:prstGeom prst="bentConnector3">
             <a:avLst>
-              <a:gd name="adj1" fmla="val 21547"/>
+              <a:gd name="adj1" fmla="val 20619"/>
             </a:avLst>
           </a:prstGeom>
           <a:ln w="19050">
@@ -7145,7 +7145,7 @@
         </p:nvSpPr>
         <p:spPr>
           <a:xfrm>
-            <a:off x="3091792" y="4789804"/>
+            <a:off x="2907723" y="4789804"/>
             <a:ext cx="386253" cy="246221"/>
           </a:xfrm>
           <a:prstGeom prst="rect">
@@ -7180,7 +7180,7 @@
         </p:nvSpPr>
         <p:spPr>
           <a:xfrm>
-            <a:off x="3692719" y="4794127"/>
+            <a:off x="3508650" y="4794127"/>
             <a:ext cx="386253" cy="246221"/>
           </a:xfrm>
           <a:prstGeom prst="rect">
@@ -7215,7 +7215,7 @@
         </p:nvSpPr>
         <p:spPr>
           <a:xfrm>
-            <a:off x="4123091" y="4795796"/>
+            <a:off x="3939022" y="4795796"/>
             <a:ext cx="386253" cy="246221"/>
           </a:xfrm>
           <a:prstGeom prst="rect">
@@ -7250,7 +7250,7 @@
         </p:nvSpPr>
         <p:spPr>
           <a:xfrm>
-            <a:off x="7266702" y="2307720"/>
+            <a:off x="7082633" y="2307720"/>
             <a:ext cx="96711" cy="132280"/>
           </a:xfrm>
           <a:prstGeom prst="rect">
@@ -7296,8 +7296,8 @@
         </p:nvSpPr>
         <p:spPr>
           <a:xfrm>
-            <a:off x="8912426" y="5165153"/>
-            <a:ext cx="1515052" cy="601464"/>
+            <a:off x="8728357" y="5165152"/>
+            <a:ext cx="1886827" cy="671288"/>
           </a:xfrm>
           <a:prstGeom prst="rect">
             <a:avLst/>
@@ -7358,7 +7358,7 @@
                   <a:srgbClr val="FFFF00"/>
                 </a:solidFill>
               </a:rPr>
-              <a:t>UndesirableEffect</a:t>
+              <a:t>UndesirableEffectDefinition</a:t>
             </a:r>
           </a:p>
           <a:p>
@@ -7369,7 +7369,18 @@
                   <a:srgbClr val="FFFF00"/>
                 </a:solidFill>
               </a:rPr>
-              <a:t>profile of ClinicalUseDefinition</a:t>
+              <a:t>profile of </a:t>
+            </a:r>
+          </a:p>
+          <a:p>
+            <a:pPr algn="ctr"/>
+            <a:r>
+              <a:rPr lang="en-US" sz="1200" noProof="1">
+                <a:solidFill>
+                  <a:srgbClr val="FFFF00"/>
+                </a:solidFill>
+              </a:rPr>
+              <a:t>ClinicalUseDefinition</a:t>
             </a:r>
           </a:p>
         </p:txBody>
@@ -7392,12 +7403,12 @@
         </p:nvCxnSpPr>
         <p:spPr>
           <a:xfrm rot="16200000" flipH="1">
-            <a:off x="7129929" y="2625129"/>
-            <a:ext cx="2725153" cy="2354894"/>
+            <a:off x="7038804" y="2532185"/>
+            <a:ext cx="2725152" cy="2540782"/>
           </a:xfrm>
           <a:prstGeom prst="bentConnector3">
             <a:avLst>
-              <a:gd name="adj1" fmla="val 15139"/>
+              <a:gd name="adj1" fmla="val 14485"/>
             </a:avLst>
           </a:prstGeom>
           <a:ln w="19050">
@@ -7434,7 +7445,7 @@
         </p:nvSpPr>
         <p:spPr>
           <a:xfrm>
-            <a:off x="8123164" y="4103291"/>
+            <a:off x="7939095" y="4103291"/>
             <a:ext cx="528095" cy="246221"/>
           </a:xfrm>
           <a:prstGeom prst="rect">
@@ -7469,8 +7480,8 @@
         </p:nvSpPr>
         <p:spPr>
           <a:xfrm>
-            <a:off x="9272238" y="4927164"/>
-            <a:ext cx="499331" cy="246221"/>
+            <a:off x="9278261" y="4951028"/>
+            <a:ext cx="399218" cy="246221"/>
           </a:xfrm>
           <a:prstGeom prst="rect">
             <a:avLst/>
@@ -7507,13 +7518,13 @@
           <p:nvPr/>
         </p:nvCxnSpPr>
         <p:spPr>
-          <a:xfrm rot="5400000">
-            <a:off x="6853750" y="3007609"/>
-            <a:ext cx="57194" cy="5575210"/>
+          <a:xfrm rot="5400000" flipH="1">
+            <a:off x="6784907" y="2949577"/>
+            <a:ext cx="12629" cy="5761098"/>
           </a:xfrm>
           <a:prstGeom prst="bentConnector3">
             <a:avLst>
-              <a:gd name="adj1" fmla="val 499692"/>
+              <a:gd name="adj1" fmla="val -1810120"/>
             </a:avLst>
           </a:prstGeom>
           <a:ln w="19050">
@@ -7550,7 +7561,7 @@
         </p:nvSpPr>
         <p:spPr>
           <a:xfrm>
-            <a:off x="4108637" y="5800112"/>
+            <a:off x="3924568" y="5800112"/>
             <a:ext cx="405123" cy="246221"/>
           </a:xfrm>
           <a:prstGeom prst="rect">
@@ -7585,7 +7596,7 @@
         </p:nvSpPr>
         <p:spPr>
           <a:xfrm>
-            <a:off x="5359915" y="5852389"/>
+            <a:off x="5175846" y="5852389"/>
             <a:ext cx="2743409" cy="246221"/>
           </a:xfrm>
           <a:prstGeom prst="rect">
@@ -7624,7 +7635,7 @@
         </p:nvSpPr>
         <p:spPr>
           <a:xfrm>
-            <a:off x="9946008" y="5986017"/>
+            <a:off x="10284455" y="5986017"/>
             <a:ext cx="1524638" cy="601464"/>
           </a:xfrm>
           <a:prstGeom prst="rect">
@@ -7686,7 +7697,7 @@
                   <a:srgbClr val="FFFF00"/>
                 </a:solidFill>
               </a:rPr>
-              <a:t>Interaction</a:t>
+              <a:t>InteractionDefinition</a:t>
             </a:r>
           </a:p>
           <a:p>
@@ -7720,12 +7731,12 @@
         </p:nvCxnSpPr>
         <p:spPr>
           <a:xfrm rot="16200000" flipH="1">
-            <a:off x="7238684" y="2516373"/>
-            <a:ext cx="3546017" cy="3393269"/>
+            <a:off x="7315873" y="2255115"/>
+            <a:ext cx="3546017" cy="3915785"/>
           </a:xfrm>
           <a:prstGeom prst="bentConnector3">
             <a:avLst>
-              <a:gd name="adj1" fmla="val 11655"/>
+              <a:gd name="adj1" fmla="val 11153"/>
             </a:avLst>
           </a:prstGeom>
           <a:ln w="19050">
@@ -7762,7 +7773,7 @@
         </p:nvSpPr>
         <p:spPr>
           <a:xfrm>
-            <a:off x="10360133" y="5788152"/>
+            <a:off x="10698580" y="5788152"/>
             <a:ext cx="465084" cy="246221"/>
           </a:xfrm>
           <a:prstGeom prst="rect">
@@ -7797,7 +7808,7 @@
         </p:nvSpPr>
         <p:spPr>
           <a:xfrm>
-            <a:off x="9650422" y="4440108"/>
+            <a:off x="9655925" y="4427807"/>
             <a:ext cx="964247" cy="646331"/>
           </a:xfrm>
           <a:prstGeom prst="rect">
@@ -7850,7 +7861,7 @@
         </p:nvSpPr>
         <p:spPr>
           <a:xfrm>
-            <a:off x="10682857" y="5593418"/>
+            <a:off x="11021304" y="5593418"/>
             <a:ext cx="1089470" cy="276999"/>
           </a:xfrm>
           <a:prstGeom prst="rect">
@@ -7907,8 +7918,8 @@
         </p:nvCxnSpPr>
         <p:spPr>
           <a:xfrm rot="10800000">
-            <a:off x="3670520" y="5838651"/>
-            <a:ext cx="6275489" cy="448099"/>
+            <a:off x="3486451" y="5838651"/>
+            <a:ext cx="6798005" cy="448099"/>
           </a:xfrm>
           <a:prstGeom prst="bentConnector2">
             <a:avLst/>
@@ -7947,7 +7958,7 @@
         </p:nvSpPr>
         <p:spPr>
           <a:xfrm>
-            <a:off x="3306584" y="5797252"/>
+            <a:off x="3122515" y="5797252"/>
             <a:ext cx="405123" cy="246221"/>
           </a:xfrm>
           <a:prstGeom prst="rect">
@@ -7982,7 +7993,7 @@
         </p:nvSpPr>
         <p:spPr>
           <a:xfrm>
-            <a:off x="7930084" y="2064923"/>
+            <a:off x="7746015" y="2064923"/>
             <a:ext cx="1089034" cy="246221"/>
           </a:xfrm>
           <a:prstGeom prst="rect">
@@ -8022,7 +8033,7 @@
         </p:nvSpPr>
         <p:spPr>
           <a:xfrm>
-            <a:off x="9139262" y="1987302"/>
+            <a:off x="8955193" y="1987302"/>
             <a:ext cx="1443992" cy="555176"/>
           </a:xfrm>
           <a:prstGeom prst="rect">
@@ -8114,7 +8125,7 @@
         </p:nvSpPr>
         <p:spPr>
           <a:xfrm>
-            <a:off x="5359915" y="6074615"/>
+            <a:off x="5175846" y="6074615"/>
             <a:ext cx="2743409" cy="246221"/>
           </a:xfrm>
           <a:prstGeom prst="rect">
@@ -8153,7 +8164,7 @@
         </p:nvSpPr>
         <p:spPr>
           <a:xfrm>
-            <a:off x="8144198" y="4824299"/>
+            <a:off x="7960129" y="4824299"/>
             <a:ext cx="96711" cy="132280"/>
           </a:xfrm>
           <a:prstGeom prst="rect">
@@ -8199,8 +8210,8 @@
         </p:nvSpPr>
         <p:spPr>
           <a:xfrm>
-            <a:off x="7677405" y="4359876"/>
-            <a:ext cx="1650670" cy="648890"/>
+            <a:off x="7406252" y="4359876"/>
+            <a:ext cx="1824838" cy="648890"/>
           </a:xfrm>
           <a:prstGeom prst="rect">
             <a:avLst/>
@@ -8261,7 +8272,7 @@
                   <a:srgbClr val="FFFF00"/>
                 </a:solidFill>
               </a:rPr>
-              <a:t>Contraindication</a:t>
+              <a:t>ContraindicationDefinition</a:t>
             </a:r>
           </a:p>
           <a:p>
@@ -8291,7 +8302,7 @@
         </p:nvSpPr>
         <p:spPr>
           <a:xfrm>
-            <a:off x="5941826" y="1687364"/>
+            <a:off x="5757757" y="1687364"/>
             <a:ext cx="105126" cy="385186"/>
           </a:xfrm>
           <a:prstGeom prst="rect">
@@ -8337,7 +8348,7 @@
         </p:nvSpPr>
         <p:spPr>
           <a:xfrm>
-            <a:off x="7174343" y="1692234"/>
+            <a:off x="6990274" y="1692234"/>
             <a:ext cx="180469" cy="125810"/>
           </a:xfrm>
           <a:prstGeom prst="rect">
@@ -8383,7 +8394,7 @@
         </p:nvSpPr>
         <p:spPr>
           <a:xfrm>
-            <a:off x="5807951" y="1682263"/>
+            <a:off x="5623882" y="1682263"/>
             <a:ext cx="1623937" cy="766043"/>
           </a:xfrm>
           <a:prstGeom prst="rect">
@@ -8445,7 +8456,7 @@
                   <a:srgbClr val="FFFF00"/>
                 </a:solidFill>
               </a:rPr>
-              <a:t>MK4Catalog</a:t>
+              <a:t>DrugKnowledge</a:t>
             </a:r>
           </a:p>
           <a:p>
@@ -8475,7 +8486,7 @@
         </p:nvSpPr>
         <p:spPr>
           <a:xfrm>
-            <a:off x="4046386" y="5691531"/>
+            <a:off x="3862317" y="5691531"/>
             <a:ext cx="96711" cy="132280"/>
           </a:xfrm>
           <a:prstGeom prst="rect">
@@ -8521,7 +8532,7 @@
         </p:nvSpPr>
         <p:spPr>
           <a:xfrm>
-            <a:off x="6032342" y="487670"/>
+            <a:off x="5848273" y="487670"/>
             <a:ext cx="1232235" cy="612769"/>
           </a:xfrm>
           <a:prstGeom prst="rect">
@@ -8587,7 +8598,7 @@
         </p:nvCxnSpPr>
         <p:spPr>
           <a:xfrm flipV="1">
-            <a:off x="4434979" y="794055"/>
+            <a:off x="4250910" y="794055"/>
             <a:ext cx="1597363" cy="1"/>
           </a:xfrm>
           <a:prstGeom prst="bentConnector3">
@@ -8633,7 +8644,7 @@
         </p:nvCxnSpPr>
         <p:spPr>
           <a:xfrm rot="10800000">
-            <a:off x="7264578" y="794056"/>
+            <a:off x="7080509" y="794056"/>
             <a:ext cx="1854395" cy="1"/>
           </a:xfrm>
           <a:prstGeom prst="bentConnector3">
@@ -8675,7 +8686,7 @@
         </p:nvSpPr>
         <p:spPr>
           <a:xfrm>
-            <a:off x="4538596" y="566938"/>
+            <a:off x="4354527" y="566938"/>
             <a:ext cx="679239" cy="246221"/>
           </a:xfrm>
           <a:prstGeom prst="rect">
@@ -8714,7 +8725,7 @@
         </p:nvSpPr>
         <p:spPr>
           <a:xfrm>
-            <a:off x="8399063" y="557603"/>
+            <a:off x="8214994" y="557603"/>
             <a:ext cx="679239" cy="246221"/>
           </a:xfrm>
           <a:prstGeom prst="rect">
@@ -8753,7 +8764,7 @@
         </p:nvSpPr>
         <p:spPr>
           <a:xfrm>
-            <a:off x="3403578" y="5056270"/>
+            <a:off x="3219509" y="5056270"/>
             <a:ext cx="96711" cy="132280"/>
           </a:xfrm>
           <a:prstGeom prst="rect">
@@ -8799,7 +8810,7 @@
         </p:nvSpPr>
         <p:spPr>
           <a:xfrm>
-            <a:off x="2840492" y="5042170"/>
+            <a:off x="2656423" y="5042170"/>
             <a:ext cx="1660053" cy="796480"/>
           </a:xfrm>
           <a:prstGeom prst="rect">
@@ -8880,7 +8891,7 @@
         </p:nvSpPr>
         <p:spPr>
           <a:xfrm>
-            <a:off x="5682581" y="29873"/>
+            <a:off x="5498512" y="29873"/>
             <a:ext cx="1931755" cy="461665"/>
           </a:xfrm>
           <a:prstGeom prst="rect">

</xml_diff>

<commit_message>
Updated clarithromycin example and Diagram for catalog of drugs
</commit_message>
<xml_diff>
--- a/input/images-source/MedicationCatalog.pptx
+++ b/input/images-source/MedicationCatalog.pptx
@@ -260,7 +260,7 @@
           <a:p>
             <a:fld id="{0A46A26B-42CF-4B68-AB09-D93023A697CD}" type="datetimeFigureOut">
               <a:rPr lang="fr-FR" smtClean="0"/>
-              <a:t>10/06/2022</a:t>
+              <a:t>08/07/2022</a:t>
             </a:fld>
             <a:endParaRPr lang="fr-FR"/>
           </a:p>
@@ -458,7 +458,7 @@
           <a:p>
             <a:fld id="{0A46A26B-42CF-4B68-AB09-D93023A697CD}" type="datetimeFigureOut">
               <a:rPr lang="fr-FR" smtClean="0"/>
-              <a:t>10/06/2022</a:t>
+              <a:t>08/07/2022</a:t>
             </a:fld>
             <a:endParaRPr lang="fr-FR"/>
           </a:p>
@@ -666,7 +666,7 @@
           <a:p>
             <a:fld id="{0A46A26B-42CF-4B68-AB09-D93023A697CD}" type="datetimeFigureOut">
               <a:rPr lang="fr-FR" smtClean="0"/>
-              <a:t>10/06/2022</a:t>
+              <a:t>08/07/2022</a:t>
             </a:fld>
             <a:endParaRPr lang="fr-FR"/>
           </a:p>
@@ -864,7 +864,7 @@
           <a:p>
             <a:fld id="{0A46A26B-42CF-4B68-AB09-D93023A697CD}" type="datetimeFigureOut">
               <a:rPr lang="fr-FR" smtClean="0"/>
-              <a:t>10/06/2022</a:t>
+              <a:t>08/07/2022</a:t>
             </a:fld>
             <a:endParaRPr lang="fr-FR"/>
           </a:p>
@@ -1139,7 +1139,7 @@
           <a:p>
             <a:fld id="{0A46A26B-42CF-4B68-AB09-D93023A697CD}" type="datetimeFigureOut">
               <a:rPr lang="fr-FR" smtClean="0"/>
-              <a:t>10/06/2022</a:t>
+              <a:t>08/07/2022</a:t>
             </a:fld>
             <a:endParaRPr lang="fr-FR"/>
           </a:p>
@@ -1404,7 +1404,7 @@
           <a:p>
             <a:fld id="{0A46A26B-42CF-4B68-AB09-D93023A697CD}" type="datetimeFigureOut">
               <a:rPr lang="fr-FR" smtClean="0"/>
-              <a:t>10/06/2022</a:t>
+              <a:t>08/07/2022</a:t>
             </a:fld>
             <a:endParaRPr lang="fr-FR"/>
           </a:p>
@@ -1816,7 +1816,7 @@
           <a:p>
             <a:fld id="{0A46A26B-42CF-4B68-AB09-D93023A697CD}" type="datetimeFigureOut">
               <a:rPr lang="fr-FR" smtClean="0"/>
-              <a:t>10/06/2022</a:t>
+              <a:t>08/07/2022</a:t>
             </a:fld>
             <a:endParaRPr lang="fr-FR"/>
           </a:p>
@@ -1957,7 +1957,7 @@
           <a:p>
             <a:fld id="{0A46A26B-42CF-4B68-AB09-D93023A697CD}" type="datetimeFigureOut">
               <a:rPr lang="fr-FR" smtClean="0"/>
-              <a:t>10/06/2022</a:t>
+              <a:t>08/07/2022</a:t>
             </a:fld>
             <a:endParaRPr lang="fr-FR"/>
           </a:p>
@@ -2070,7 +2070,7 @@
           <a:p>
             <a:fld id="{0A46A26B-42CF-4B68-AB09-D93023A697CD}" type="datetimeFigureOut">
               <a:rPr lang="fr-FR" smtClean="0"/>
-              <a:t>10/06/2022</a:t>
+              <a:t>08/07/2022</a:t>
             </a:fld>
             <a:endParaRPr lang="fr-FR"/>
           </a:p>
@@ -2381,7 +2381,7 @@
           <a:p>
             <a:fld id="{0A46A26B-42CF-4B68-AB09-D93023A697CD}" type="datetimeFigureOut">
               <a:rPr lang="fr-FR" smtClean="0"/>
-              <a:t>10/06/2022</a:t>
+              <a:t>08/07/2022</a:t>
             </a:fld>
             <a:endParaRPr lang="fr-FR"/>
           </a:p>
@@ -2669,7 +2669,7 @@
           <a:p>
             <a:fld id="{0A46A26B-42CF-4B68-AB09-D93023A697CD}" type="datetimeFigureOut">
               <a:rPr lang="fr-FR" smtClean="0"/>
-              <a:t>10/06/2022</a:t>
+              <a:t>08/07/2022</a:t>
             </a:fld>
             <a:endParaRPr lang="fr-FR"/>
           </a:p>
@@ -2910,7 +2910,7 @@
           <a:p>
             <a:fld id="{0A46A26B-42CF-4B68-AB09-D93023A697CD}" type="datetimeFigureOut">
               <a:rPr lang="fr-FR" smtClean="0"/>
-              <a:t>10/06/2022</a:t>
+              <a:t>08/07/2022</a:t>
             </a:fld>
             <a:endParaRPr lang="fr-FR"/>
           </a:p>
@@ -8259,8 +8259,8 @@
         </p:nvCxnSpPr>
         <p:spPr>
           <a:xfrm>
-            <a:off x="7014491" y="2264521"/>
-            <a:ext cx="2616801" cy="369"/>
+            <a:off x="7032902" y="2264521"/>
+            <a:ext cx="1868095" cy="369"/>
           </a:xfrm>
           <a:prstGeom prst="bentConnector3">
             <a:avLst>
@@ -8301,7 +8301,7 @@
         </p:nvSpPr>
         <p:spPr>
           <a:xfrm>
-            <a:off x="9292663" y="2279905"/>
+            <a:off x="8562368" y="2279905"/>
             <a:ext cx="417459" cy="246221"/>
           </a:xfrm>
           <a:prstGeom prst="rect">
@@ -8336,8 +8336,8 @@
         </p:nvSpPr>
         <p:spPr>
           <a:xfrm>
-            <a:off x="7164011" y="2064923"/>
-            <a:ext cx="2065906" cy="246221"/>
+            <a:off x="7074576" y="2047726"/>
+            <a:ext cx="1853322" cy="246221"/>
           </a:xfrm>
           <a:prstGeom prst="rect">
             <a:avLst/>
@@ -8362,6 +8362,134 @@
           </a:p>
         </p:txBody>
       </p:sp>
+      <p:cxnSp>
+        <p:nvCxnSpPr>
+          <p:cNvPr id="116" name="Connecteur : en angle 115">
+            <a:extLst>
+              <a:ext uri="{FF2B5EF4-FFF2-40B4-BE49-F238E27FC236}">
+                <a16:creationId xmlns:a16="http://schemas.microsoft.com/office/drawing/2014/main" id="{F19CB25A-BDC4-A88B-B9E7-7046B7BEE7CA}"/>
+              </a:ext>
+            </a:extLst>
+          </p:cNvPr>
+          <p:cNvCxnSpPr>
+            <a:cxnSpLocks/>
+            <a:stCxn id="119" idx="3"/>
+            <a:endCxn id="119" idx="0"/>
+          </p:cNvCxnSpPr>
+          <p:nvPr/>
+        </p:nvCxnSpPr>
+        <p:spPr>
+          <a:xfrm flipH="1" flipV="1">
+            <a:off x="10687550" y="1950801"/>
+            <a:ext cx="90234" cy="62905"/>
+          </a:xfrm>
+          <a:prstGeom prst="bentConnector4">
+            <a:avLst>
+              <a:gd name="adj1" fmla="val -253341"/>
+              <a:gd name="adj2" fmla="val 463405"/>
+            </a:avLst>
+          </a:prstGeom>
+          <a:ln w="19050">
+            <a:headEnd type="arrow" w="med" len="med"/>
+            <a:tailEnd type="none" w="med" len="med"/>
+          </a:ln>
+        </p:spPr>
+        <p:style>
+          <a:lnRef idx="1">
+            <a:schemeClr val="accent1"/>
+          </a:lnRef>
+          <a:fillRef idx="0">
+            <a:schemeClr val="accent1"/>
+          </a:fillRef>
+          <a:effectRef idx="0">
+            <a:schemeClr val="accent1"/>
+          </a:effectRef>
+          <a:fontRef idx="minor">
+            <a:schemeClr val="tx1"/>
+          </a:fontRef>
+        </p:style>
+      </p:cxnSp>
+      <p:sp>
+        <p:nvSpPr>
+          <p:cNvPr id="117" name="ZoneTexte 116">
+            <a:extLst>
+              <a:ext uri="{FF2B5EF4-FFF2-40B4-BE49-F238E27FC236}">
+                <a16:creationId xmlns:a16="http://schemas.microsoft.com/office/drawing/2014/main" id="{7994CA5B-DBEB-DBAD-BA04-7CE03C822319}"/>
+              </a:ext>
+            </a:extLst>
+          </p:cNvPr>
+          <p:cNvSpPr txBox="1"/>
+          <p:nvPr/>
+        </p:nvSpPr>
+        <p:spPr>
+          <a:xfrm>
+            <a:off x="10708994" y="2009798"/>
+            <a:ext cx="417459" cy="246221"/>
+          </a:xfrm>
+          <a:prstGeom prst="rect">
+            <a:avLst/>
+          </a:prstGeom>
+          <a:noFill/>
+        </p:spPr>
+        <p:txBody>
+          <a:bodyPr wrap="square" rtlCol="0">
+            <a:spAutoFit/>
+          </a:bodyPr>
+          <a:lstStyle/>
+          <a:p>
+            <a:r>
+              <a:rPr lang="en-US" sz="1000" noProof="1"/>
+              <a:t>0..*</a:t>
+            </a:r>
+          </a:p>
+        </p:txBody>
+      </p:sp>
+      <p:sp>
+        <p:nvSpPr>
+          <p:cNvPr id="119" name="Rectangle 118">
+            <a:extLst>
+              <a:ext uri="{FF2B5EF4-FFF2-40B4-BE49-F238E27FC236}">
+                <a16:creationId xmlns:a16="http://schemas.microsoft.com/office/drawing/2014/main" id="{942EC9FD-F82D-6E05-58EF-D704E2048CE9}"/>
+              </a:ext>
+            </a:extLst>
+          </p:cNvPr>
+          <p:cNvSpPr/>
+          <p:nvPr/>
+        </p:nvSpPr>
+        <p:spPr>
+          <a:xfrm>
+            <a:off x="10597315" y="1950801"/>
+            <a:ext cx="180469" cy="125810"/>
+          </a:xfrm>
+          <a:prstGeom prst="rect">
+            <a:avLst/>
+          </a:prstGeom>
+        </p:spPr>
+        <p:style>
+          <a:lnRef idx="2">
+            <a:schemeClr val="accent1">
+              <a:shade val="50000"/>
+            </a:schemeClr>
+          </a:lnRef>
+          <a:fillRef idx="1">
+            <a:schemeClr val="accent1"/>
+          </a:fillRef>
+          <a:effectRef idx="0">
+            <a:schemeClr val="accent1"/>
+          </a:effectRef>
+          <a:fontRef idx="minor">
+            <a:schemeClr val="lt1"/>
+          </a:fontRef>
+        </p:style>
+        <p:txBody>
+          <a:bodyPr rtlCol="0" anchor="ctr"/>
+          <a:lstStyle/>
+          <a:p>
+            <a:pPr algn="ctr"/>
+            <a:endParaRPr lang="fr-FR" sz="1050"/>
+          </a:p>
+        </p:txBody>
+      </p:sp>
       <p:sp>
         <p:nvSpPr>
           <p:cNvPr id="129" name="Rectangle 128">
@@ -8376,7 +8504,7 @@
         </p:nvSpPr>
         <p:spPr>
           <a:xfrm>
-            <a:off x="9631292" y="1937367"/>
+            <a:off x="8900997" y="1937367"/>
             <a:ext cx="1886827" cy="655046"/>
           </a:xfrm>
           <a:prstGeom prst="rect">
@@ -8451,6 +8579,86 @@
               </a:rPr>
               <a:t>profile of PackagedProductDefinition</a:t>
             </a:r>
+          </a:p>
+        </p:txBody>
+      </p:sp>
+      <p:sp>
+        <p:nvSpPr>
+          <p:cNvPr id="120" name="Rectangle 119">
+            <a:extLst>
+              <a:ext uri="{FF2B5EF4-FFF2-40B4-BE49-F238E27FC236}">
+                <a16:creationId xmlns:a16="http://schemas.microsoft.com/office/drawing/2014/main" id="{FD40DDBA-1597-39D7-D307-71F21624E3B9}"/>
+              </a:ext>
+            </a:extLst>
+          </p:cNvPr>
+          <p:cNvSpPr/>
+          <p:nvPr/>
+        </p:nvSpPr>
+        <p:spPr>
+          <a:xfrm>
+            <a:off x="10448966" y="1479745"/>
+            <a:ext cx="1679541" cy="246221"/>
+          </a:xfrm>
+          <a:prstGeom prst="rect">
+            <a:avLst/>
+          </a:prstGeom>
+        </p:spPr>
+        <p:txBody>
+          <a:bodyPr wrap="square">
+            <a:spAutoFit/>
+          </a:bodyPr>
+          <a:lstStyle/>
+          <a:p>
+            <a:r>
+              <a:rPr lang="en-US" sz="1000" noProof="1">
+                <a:solidFill>
+                  <a:srgbClr val="0070C0"/>
+                </a:solidFill>
+              </a:rPr>
+              <a:t>package.containedItem.item </a:t>
+            </a:r>
+          </a:p>
+        </p:txBody>
+      </p:sp>
+      <p:sp>
+        <p:nvSpPr>
+          <p:cNvPr id="130" name="Rectangle 129">
+            <a:extLst>
+              <a:ext uri="{FF2B5EF4-FFF2-40B4-BE49-F238E27FC236}">
+                <a16:creationId xmlns:a16="http://schemas.microsoft.com/office/drawing/2014/main" id="{EE89E59D-A8B8-46D9-EC0A-7DCFBFE4E748}"/>
+              </a:ext>
+            </a:extLst>
+          </p:cNvPr>
+          <p:cNvSpPr/>
+          <p:nvPr/>
+        </p:nvSpPr>
+        <p:spPr>
+          <a:xfrm>
+            <a:off x="11019958" y="1694143"/>
+            <a:ext cx="929657" cy="400110"/>
+          </a:xfrm>
+          <a:prstGeom prst="rect">
+            <a:avLst/>
+          </a:prstGeom>
+        </p:spPr>
+        <p:txBody>
+          <a:bodyPr wrap="square">
+            <a:spAutoFit/>
+          </a:bodyPr>
+          <a:lstStyle/>
+          <a:p>
+            <a:r>
+              <a:rPr lang="en-US" sz="1000" noProof="1"/>
+              <a:t>( a contained package)</a:t>
+            </a:r>
+            <a:endParaRPr lang="en-US" sz="1000" noProof="1">
+              <a:solidFill>
+                <a:schemeClr val="tx1">
+                  <a:lumMod val="50000"/>
+                  <a:lumOff val="50000"/>
+                </a:schemeClr>
+              </a:solidFill>
+            </a:endParaRPr>
           </a:p>
         </p:txBody>
       </p:sp>
@@ -9260,8 +9468,8 @@
         </p:nvSpPr>
         <p:spPr>
           <a:xfrm>
-            <a:off x="7192495" y="1679268"/>
-            <a:ext cx="3208932" cy="246221"/>
+            <a:off x="7201646" y="1590525"/>
+            <a:ext cx="1785912" cy="400110"/>
           </a:xfrm>
           <a:prstGeom prst="rect">
             <a:avLst/>
@@ -11564,10 +11772,10 @@
       </p:sp>
       <p:sp>
         <p:nvSpPr>
-          <p:cNvPr id="129" name="Rectangle 128">
-            <a:extLst>
-              <a:ext uri="{FF2B5EF4-FFF2-40B4-BE49-F238E27FC236}">
-                <a16:creationId xmlns:a16="http://schemas.microsoft.com/office/drawing/2014/main" id="{A9099836-BBF8-FEB3-4E56-E759F803868A}"/>
+          <p:cNvPr id="116" name="Rectangle 115">
+            <a:extLst>
+              <a:ext uri="{FF2B5EF4-FFF2-40B4-BE49-F238E27FC236}">
+                <a16:creationId xmlns:a16="http://schemas.microsoft.com/office/drawing/2014/main" id="{BC760747-110B-FEE6-F826-EE314598DF54}"/>
               </a:ext>
             </a:extLst>
           </p:cNvPr>
@@ -11576,8 +11784,54 @@
         </p:nvSpPr>
         <p:spPr>
           <a:xfrm>
-            <a:off x="8778255" y="1937367"/>
-            <a:ext cx="1886827" cy="655046"/>
+            <a:off x="6835894" y="2210516"/>
+            <a:ext cx="191812" cy="110015"/>
+          </a:xfrm>
+          <a:prstGeom prst="rect">
+            <a:avLst/>
+          </a:prstGeom>
+        </p:spPr>
+        <p:style>
+          <a:lnRef idx="2">
+            <a:schemeClr val="accent1">
+              <a:shade val="50000"/>
+            </a:schemeClr>
+          </a:lnRef>
+          <a:fillRef idx="1">
+            <a:schemeClr val="accent1"/>
+          </a:fillRef>
+          <a:effectRef idx="0">
+            <a:schemeClr val="accent1"/>
+          </a:effectRef>
+          <a:fontRef idx="minor">
+            <a:schemeClr val="lt1"/>
+          </a:fontRef>
+        </p:style>
+        <p:txBody>
+          <a:bodyPr rtlCol="0" anchor="ctr"/>
+          <a:lstStyle/>
+          <a:p>
+            <a:pPr algn="ctr"/>
+            <a:endParaRPr lang="fr-FR" sz="1050"/>
+          </a:p>
+        </p:txBody>
+      </p:sp>
+      <p:sp>
+        <p:nvSpPr>
+          <p:cNvPr id="114" name="Rectangle 113">
+            <a:extLst>
+              <a:ext uri="{FF2B5EF4-FFF2-40B4-BE49-F238E27FC236}">
+                <a16:creationId xmlns:a16="http://schemas.microsoft.com/office/drawing/2014/main" id="{79B6C1C6-DB63-4910-B033-6AA7BC75C979}"/>
+              </a:ext>
+            </a:extLst>
+          </p:cNvPr>
+          <p:cNvSpPr/>
+          <p:nvPr/>
+        </p:nvSpPr>
+        <p:spPr>
+          <a:xfrm>
+            <a:off x="5410125" y="1682263"/>
+            <a:ext cx="1623937" cy="766043"/>
           </a:xfrm>
           <a:prstGeom prst="rect">
             <a:avLst/>
@@ -11628,7 +11882,7 @@
           </a:fontRef>
         </p:style>
         <p:txBody>
-          <a:bodyPr rtlCol="0" anchor="ctr"/>
+          <a:bodyPr lIns="36000" rIns="36000" rtlCol="0" anchor="ctr"/>
           <a:lstStyle/>
           <a:p>
             <a:pPr algn="ctr"/>
@@ -11638,7 +11892,7 @@
                   <a:srgbClr val="FFFF00"/>
                 </a:solidFill>
               </a:rPr>
-              <a:t>DrugPackage </a:t>
+              <a:t>DrugKnowledge</a:t>
             </a:r>
           </a:p>
           <a:p>
@@ -11649,17 +11903,134 @@
                   <a:srgbClr val="FFFF00"/>
                 </a:solidFill>
               </a:rPr>
-              <a:t>profile of PackagedProductDefinition</a:t>
-            </a:r>
-          </a:p>
-        </p:txBody>
-      </p:sp>
-      <p:sp>
-        <p:nvSpPr>
-          <p:cNvPr id="116" name="Rectangle 115">
-            <a:extLst>
-              <a:ext uri="{FF2B5EF4-FFF2-40B4-BE49-F238E27FC236}">
-                <a16:creationId xmlns:a16="http://schemas.microsoft.com/office/drawing/2014/main" id="{BC760747-110B-FEE6-F826-EE314598DF54}"/>
+              <a:t>profile of MedicationKnowledge</a:t>
+            </a:r>
+          </a:p>
+        </p:txBody>
+      </p:sp>
+      <p:sp>
+        <p:nvSpPr>
+          <p:cNvPr id="130" name="ZoneTexte 129">
+            <a:extLst>
+              <a:ext uri="{FF2B5EF4-FFF2-40B4-BE49-F238E27FC236}">
+                <a16:creationId xmlns:a16="http://schemas.microsoft.com/office/drawing/2014/main" id="{255D5A44-1612-BF8D-B2DF-AF22462136B7}"/>
+              </a:ext>
+            </a:extLst>
+          </p:cNvPr>
+          <p:cNvSpPr txBox="1"/>
+          <p:nvPr/>
+        </p:nvSpPr>
+        <p:spPr>
+          <a:xfrm>
+            <a:off x="8364342" y="5539911"/>
+            <a:ext cx="528095" cy="246221"/>
+          </a:xfrm>
+          <a:prstGeom prst="rect">
+            <a:avLst/>
+          </a:prstGeom>
+          <a:noFill/>
+        </p:spPr>
+        <p:txBody>
+          <a:bodyPr wrap="square" rtlCol="0">
+            <a:spAutoFit/>
+          </a:bodyPr>
+          <a:lstStyle/>
+          <a:p>
+            <a:r>
+              <a:rPr lang="en-US" sz="1000" noProof="1"/>
+              <a:t>0..*</a:t>
+            </a:r>
+          </a:p>
+        </p:txBody>
+      </p:sp>
+      <p:cxnSp>
+        <p:nvCxnSpPr>
+          <p:cNvPr id="73" name="Connecteur : en angle 72">
+            <a:extLst>
+              <a:ext uri="{FF2B5EF4-FFF2-40B4-BE49-F238E27FC236}">
+                <a16:creationId xmlns:a16="http://schemas.microsoft.com/office/drawing/2014/main" id="{5C3B05BD-A20B-F126-B0C7-430EFCEFAC9D}"/>
+              </a:ext>
+            </a:extLst>
+          </p:cNvPr>
+          <p:cNvCxnSpPr>
+            <a:cxnSpLocks/>
+            <a:stCxn id="75" idx="3"/>
+            <a:endCxn id="75" idx="0"/>
+          </p:cNvCxnSpPr>
+          <p:nvPr/>
+        </p:nvCxnSpPr>
+        <p:spPr>
+          <a:xfrm flipH="1" flipV="1">
+            <a:off x="10559734" y="1956502"/>
+            <a:ext cx="90234" cy="62905"/>
+          </a:xfrm>
+          <a:prstGeom prst="bentConnector4">
+            <a:avLst>
+              <a:gd name="adj1" fmla="val -253341"/>
+              <a:gd name="adj2" fmla="val 463405"/>
+            </a:avLst>
+          </a:prstGeom>
+          <a:ln w="19050">
+            <a:headEnd type="arrow" w="med" len="med"/>
+            <a:tailEnd type="none" w="med" len="med"/>
+          </a:ln>
+        </p:spPr>
+        <p:style>
+          <a:lnRef idx="1">
+            <a:schemeClr val="accent1"/>
+          </a:lnRef>
+          <a:fillRef idx="0">
+            <a:schemeClr val="accent1"/>
+          </a:fillRef>
+          <a:effectRef idx="0">
+            <a:schemeClr val="accent1"/>
+          </a:effectRef>
+          <a:fontRef idx="minor">
+            <a:schemeClr val="tx1"/>
+          </a:fontRef>
+        </p:style>
+      </p:cxnSp>
+      <p:sp>
+        <p:nvSpPr>
+          <p:cNvPr id="74" name="ZoneTexte 73">
+            <a:extLst>
+              <a:ext uri="{FF2B5EF4-FFF2-40B4-BE49-F238E27FC236}">
+                <a16:creationId xmlns:a16="http://schemas.microsoft.com/office/drawing/2014/main" id="{E58FC43B-1344-BF8C-DEC8-83E98B945DDB}"/>
+              </a:ext>
+            </a:extLst>
+          </p:cNvPr>
+          <p:cNvSpPr txBox="1"/>
+          <p:nvPr/>
+        </p:nvSpPr>
+        <p:spPr>
+          <a:xfrm>
+            <a:off x="10581178" y="2015499"/>
+            <a:ext cx="417459" cy="246221"/>
+          </a:xfrm>
+          <a:prstGeom prst="rect">
+            <a:avLst/>
+          </a:prstGeom>
+          <a:noFill/>
+        </p:spPr>
+        <p:txBody>
+          <a:bodyPr wrap="square" rtlCol="0">
+            <a:spAutoFit/>
+          </a:bodyPr>
+          <a:lstStyle/>
+          <a:p>
+            <a:r>
+              <a:rPr lang="en-US" sz="1000" noProof="1"/>
+              <a:t>0..*</a:t>
+            </a:r>
+          </a:p>
+        </p:txBody>
+      </p:sp>
+      <p:sp>
+        <p:nvSpPr>
+          <p:cNvPr id="75" name="Rectangle 74">
+            <a:extLst>
+              <a:ext uri="{FF2B5EF4-FFF2-40B4-BE49-F238E27FC236}">
+                <a16:creationId xmlns:a16="http://schemas.microsoft.com/office/drawing/2014/main" id="{B1E0BC8D-FC53-74D7-DA91-933C1957215F}"/>
               </a:ext>
             </a:extLst>
           </p:cNvPr>
@@ -11668,8 +12039,8 @@
         </p:nvSpPr>
         <p:spPr>
           <a:xfrm>
-            <a:off x="6835894" y="2210516"/>
-            <a:ext cx="191812" cy="110015"/>
+            <a:off x="10469499" y="1956502"/>
+            <a:ext cx="180469" cy="125810"/>
           </a:xfrm>
           <a:prstGeom prst="rect">
             <a:avLst/>
@@ -11702,10 +12073,10 @@
       </p:sp>
       <p:sp>
         <p:nvSpPr>
-          <p:cNvPr id="114" name="Rectangle 113">
-            <a:extLst>
-              <a:ext uri="{FF2B5EF4-FFF2-40B4-BE49-F238E27FC236}">
-                <a16:creationId xmlns:a16="http://schemas.microsoft.com/office/drawing/2014/main" id="{79B6C1C6-DB63-4910-B033-6AA7BC75C979}"/>
+          <p:cNvPr id="76" name="Rectangle 75">
+            <a:extLst>
+              <a:ext uri="{FF2B5EF4-FFF2-40B4-BE49-F238E27FC236}">
+                <a16:creationId xmlns:a16="http://schemas.microsoft.com/office/drawing/2014/main" id="{7D644768-6B69-5C79-0AAC-9BA2FD688DFE}"/>
               </a:ext>
             </a:extLst>
           </p:cNvPr>
@@ -11714,8 +12085,88 @@
         </p:nvSpPr>
         <p:spPr>
           <a:xfrm>
-            <a:off x="5410125" y="1682263"/>
-            <a:ext cx="1623937" cy="766043"/>
+            <a:off x="10337052" y="1485446"/>
+            <a:ext cx="1679541" cy="246221"/>
+          </a:xfrm>
+          <a:prstGeom prst="rect">
+            <a:avLst/>
+          </a:prstGeom>
+        </p:spPr>
+        <p:txBody>
+          <a:bodyPr wrap="square">
+            <a:spAutoFit/>
+          </a:bodyPr>
+          <a:lstStyle/>
+          <a:p>
+            <a:r>
+              <a:rPr lang="en-US" sz="1000" noProof="1">
+                <a:solidFill>
+                  <a:srgbClr val="0070C0"/>
+                </a:solidFill>
+              </a:rPr>
+              <a:t>package.containedItem.item </a:t>
+            </a:r>
+          </a:p>
+        </p:txBody>
+      </p:sp>
+      <p:sp>
+        <p:nvSpPr>
+          <p:cNvPr id="77" name="Rectangle 76">
+            <a:extLst>
+              <a:ext uri="{FF2B5EF4-FFF2-40B4-BE49-F238E27FC236}">
+                <a16:creationId xmlns:a16="http://schemas.microsoft.com/office/drawing/2014/main" id="{E9CC24C4-1192-CE79-8C19-70BC3D2B3F7E}"/>
+              </a:ext>
+            </a:extLst>
+          </p:cNvPr>
+          <p:cNvSpPr/>
+          <p:nvPr/>
+        </p:nvSpPr>
+        <p:spPr>
+          <a:xfrm>
+            <a:off x="10892142" y="1699844"/>
+            <a:ext cx="1092466" cy="461665"/>
+          </a:xfrm>
+          <a:prstGeom prst="rect">
+            <a:avLst/>
+          </a:prstGeom>
+        </p:spPr>
+        <p:txBody>
+          <a:bodyPr wrap="square">
+            <a:spAutoFit/>
+          </a:bodyPr>
+          <a:lstStyle/>
+          <a:p>
+            <a:r>
+              <a:rPr lang="en-US" sz="1200" noProof="1"/>
+              <a:t>( a contained package)</a:t>
+            </a:r>
+            <a:endParaRPr lang="en-US" sz="1200" noProof="1">
+              <a:solidFill>
+                <a:schemeClr val="tx1">
+                  <a:lumMod val="50000"/>
+                  <a:lumOff val="50000"/>
+                </a:schemeClr>
+              </a:solidFill>
+            </a:endParaRPr>
+          </a:p>
+        </p:txBody>
+      </p:sp>
+      <p:sp>
+        <p:nvSpPr>
+          <p:cNvPr id="129" name="Rectangle 128">
+            <a:extLst>
+              <a:ext uri="{FF2B5EF4-FFF2-40B4-BE49-F238E27FC236}">
+                <a16:creationId xmlns:a16="http://schemas.microsoft.com/office/drawing/2014/main" id="{A9099836-BBF8-FEB3-4E56-E759F803868A}"/>
+              </a:ext>
+            </a:extLst>
+          </p:cNvPr>
+          <p:cNvSpPr/>
+          <p:nvPr/>
+        </p:nvSpPr>
+        <p:spPr>
+          <a:xfrm>
+            <a:off x="8778255" y="1937367"/>
+            <a:ext cx="1886827" cy="655046"/>
           </a:xfrm>
           <a:prstGeom prst="rect">
             <a:avLst/>
@@ -11766,7 +12217,7 @@
           </a:fontRef>
         </p:style>
         <p:txBody>
-          <a:bodyPr lIns="36000" rIns="36000" rtlCol="0" anchor="ctr"/>
+          <a:bodyPr rtlCol="0" anchor="ctr"/>
           <a:lstStyle/>
           <a:p>
             <a:pPr algn="ctr"/>
@@ -11776,7 +12227,7 @@
                   <a:srgbClr val="FFFF00"/>
                 </a:solidFill>
               </a:rPr>
-              <a:t>DrugKnowledge</a:t>
+              <a:t>DrugPackage </a:t>
             </a:r>
           </a:p>
           <a:p>
@@ -11787,42 +12238,7 @@
                   <a:srgbClr val="FFFF00"/>
                 </a:solidFill>
               </a:rPr>
-              <a:t>profile of MedicationKnowledge</a:t>
-            </a:r>
-          </a:p>
-        </p:txBody>
-      </p:sp>
-      <p:sp>
-        <p:nvSpPr>
-          <p:cNvPr id="130" name="ZoneTexte 129">
-            <a:extLst>
-              <a:ext uri="{FF2B5EF4-FFF2-40B4-BE49-F238E27FC236}">
-                <a16:creationId xmlns:a16="http://schemas.microsoft.com/office/drawing/2014/main" id="{255D5A44-1612-BF8D-B2DF-AF22462136B7}"/>
-              </a:ext>
-            </a:extLst>
-          </p:cNvPr>
-          <p:cNvSpPr txBox="1"/>
-          <p:nvPr/>
-        </p:nvSpPr>
-        <p:spPr>
-          <a:xfrm>
-            <a:off x="8364342" y="5539911"/>
-            <a:ext cx="528095" cy="246221"/>
-          </a:xfrm>
-          <a:prstGeom prst="rect">
-            <a:avLst/>
-          </a:prstGeom>
-          <a:noFill/>
-        </p:spPr>
-        <p:txBody>
-          <a:bodyPr wrap="square" rtlCol="0">
-            <a:spAutoFit/>
-          </a:bodyPr>
-          <a:lstStyle/>
-          <a:p>
-            <a:r>
-              <a:rPr lang="en-US" sz="1000" noProof="1"/>
-              <a:t>0..*</a:t>
+              <a:t>profile of PackagedProductDefinition</a:t>
             </a:r>
           </a:p>
         </p:txBody>

</xml_diff>